<commit_message>
feat (all commit projet update)
</commit_message>
<xml_diff>
--- a/Support B.S.pptx
+++ b/Support B.S.pptx
@@ -12,6 +12,10 @@
     <p:sldId id="259" r:id="rId6"/>
     <p:sldId id="260" r:id="rId7"/>
     <p:sldId id="261" r:id="rId8"/>
+    <p:sldId id="264" r:id="rId9"/>
+    <p:sldId id="265" r:id="rId10"/>
+    <p:sldId id="266" r:id="rId11"/>
+    <p:sldId id="267" r:id="rId12"/>
   </p:sldIdLst>
   <p:sldSz cx="12192000" cy="6858000"/>
   <p:notesSz cx="6858000" cy="9144000"/>
@@ -122,6 +126,7 @@
 <p1510:revInfo xmlns:a="http://schemas.openxmlformats.org/drawingml/2006/main" xmlns:r="http://schemas.openxmlformats.org/officeDocument/2006/relationships" xmlns:p1510="http://schemas.microsoft.com/office/powerpoint/2015/10/main">
   <p1510:revLst>
     <p1510:client id="{412B516B-712C-4203-92F3-A474B70D7CB4}" v="58" dt="2020-02-12T20:20:26.108"/>
+    <p1510:client id="{C06D141E-A32E-47A3-953C-037F78B3363B}" v="12" dt="2020-02-13T07:09:11.291"/>
   </p1510:revLst>
 </p1510:revInfo>
 </file>
@@ -189,6 +194,535 @@
             <ac:cxnSpMk id="12" creationId="{38FB9660-F42F-4313-BBC4-47C007FE484C}"/>
           </ac:cxnSpMkLst>
         </pc:cxnChg>
+      </pc:sldChg>
+    </pc:docChg>
+  </pc:docChgLst>
+  <pc:docChgLst>
+    <pc:chgData name="Alexis PHELIPPON" userId="10a659cf0343d5b5" providerId="LiveId" clId="{C06D141E-A32E-47A3-953C-037F78B3363B}"/>
+    <pc:docChg chg="undo custSel mod addSld modSld sldOrd">
+      <pc:chgData name="Alexis PHELIPPON" userId="10a659cf0343d5b5" providerId="LiveId" clId="{C06D141E-A32E-47A3-953C-037F78B3363B}" dt="2020-02-13T07:10:50.585" v="486" actId="1076"/>
+      <pc:docMkLst>
+        <pc:docMk/>
+      </pc:docMkLst>
+      <pc:sldChg chg="addSp delSp modSp mod setBg">
+        <pc:chgData name="Alexis PHELIPPON" userId="10a659cf0343d5b5" providerId="LiveId" clId="{C06D141E-A32E-47A3-953C-037F78B3363B}" dt="2020-02-13T06:52:41.371" v="163" actId="1076"/>
+        <pc:sldMkLst>
+          <pc:docMk/>
+          <pc:sldMk cId="1916691901" sldId="258"/>
+        </pc:sldMkLst>
+        <pc:spChg chg="mod">
+          <ac:chgData name="Alexis PHELIPPON" userId="10a659cf0343d5b5" providerId="LiveId" clId="{C06D141E-A32E-47A3-953C-037F78B3363B}" dt="2020-02-13T06:52:13.206" v="161" actId="26606"/>
+          <ac:spMkLst>
+            <pc:docMk/>
+            <pc:sldMk cId="1916691901" sldId="258"/>
+            <ac:spMk id="2" creationId="{6CFDD7C0-B46E-4C1A-BF92-97AC6D6F339E}"/>
+          </ac:spMkLst>
+        </pc:spChg>
+        <pc:spChg chg="mod ord">
+          <ac:chgData name="Alexis PHELIPPON" userId="10a659cf0343d5b5" providerId="LiveId" clId="{C06D141E-A32E-47A3-953C-037F78B3363B}" dt="2020-02-13T06:52:41.371" v="163" actId="1076"/>
+          <ac:spMkLst>
+            <pc:docMk/>
+            <pc:sldMk cId="1916691901" sldId="258"/>
+            <ac:spMk id="3" creationId="{7B91B7D3-596E-4C71-82FB-67507964DBEA}"/>
+          </ac:spMkLst>
+        </pc:spChg>
+        <pc:spChg chg="del">
+          <ac:chgData name="Alexis PHELIPPON" userId="10a659cf0343d5b5" providerId="LiveId" clId="{C06D141E-A32E-47A3-953C-037F78B3363B}" dt="2020-02-13T06:52:13.206" v="161" actId="26606"/>
+          <ac:spMkLst>
+            <pc:docMk/>
+            <pc:sldMk cId="1916691901" sldId="258"/>
+            <ac:spMk id="10" creationId="{5B32A67F-3598-4A13-8552-DA884FFCCE57}"/>
+          </ac:spMkLst>
+        </pc:spChg>
+        <pc:spChg chg="del">
+          <ac:chgData name="Alexis PHELIPPON" userId="10a659cf0343d5b5" providerId="LiveId" clId="{C06D141E-A32E-47A3-953C-037F78B3363B}" dt="2020-02-13T06:52:13.206" v="161" actId="26606"/>
+          <ac:spMkLst>
+            <pc:docMk/>
+            <pc:sldMk cId="1916691901" sldId="258"/>
+            <ac:spMk id="12" creationId="{BCC55ACC-A2F6-403C-A3A4-D59B3734D45F}"/>
+          </ac:spMkLst>
+        </pc:spChg>
+        <pc:spChg chg="del">
+          <ac:chgData name="Alexis PHELIPPON" userId="10a659cf0343d5b5" providerId="LiveId" clId="{C06D141E-A32E-47A3-953C-037F78B3363B}" dt="2020-02-13T06:52:13.206" v="161" actId="26606"/>
+          <ac:spMkLst>
+            <pc:docMk/>
+            <pc:sldMk cId="1916691901" sldId="258"/>
+            <ac:spMk id="14" creationId="{598EBA13-C937-430B-9523-439FE21096E6}"/>
+          </ac:spMkLst>
+        </pc:spChg>
+        <pc:spChg chg="add">
+          <ac:chgData name="Alexis PHELIPPON" userId="10a659cf0343d5b5" providerId="LiveId" clId="{C06D141E-A32E-47A3-953C-037F78B3363B}" dt="2020-02-13T06:52:13.206" v="161" actId="26606"/>
+          <ac:spMkLst>
+            <pc:docMk/>
+            <pc:sldMk cId="1916691901" sldId="258"/>
+            <ac:spMk id="19" creationId="{823AC064-BC96-4F32-8AE1-B2FD38754823}"/>
+          </ac:spMkLst>
+        </pc:spChg>
+        <pc:picChg chg="add mod">
+          <ac:chgData name="Alexis PHELIPPON" userId="10a659cf0343d5b5" providerId="LiveId" clId="{C06D141E-A32E-47A3-953C-037F78B3363B}" dt="2020-02-13T06:52:13.206" v="161" actId="26606"/>
+          <ac:picMkLst>
+            <pc:docMk/>
+            <pc:sldMk cId="1916691901" sldId="258"/>
+            <ac:picMk id="4" creationId="{E97A8F1A-606B-459E-987B-ABFF28844D1E}"/>
+          </ac:picMkLst>
+        </pc:picChg>
+        <pc:picChg chg="mod">
+          <ac:chgData name="Alexis PHELIPPON" userId="10a659cf0343d5b5" providerId="LiveId" clId="{C06D141E-A32E-47A3-953C-037F78B3363B}" dt="2020-02-13T06:52:13.206" v="161" actId="26606"/>
+          <ac:picMkLst>
+            <pc:docMk/>
+            <pc:sldMk cId="1916691901" sldId="258"/>
+            <ac:picMk id="11" creationId="{D7FD90CC-57C9-4FC7-B38B-A384C4A7656F}"/>
+          </ac:picMkLst>
+        </pc:picChg>
+        <pc:cxnChg chg="add">
+          <ac:chgData name="Alexis PHELIPPON" userId="10a659cf0343d5b5" providerId="LiveId" clId="{C06D141E-A32E-47A3-953C-037F78B3363B}" dt="2020-02-13T06:52:13.206" v="161" actId="26606"/>
+          <ac:cxnSpMkLst>
+            <pc:docMk/>
+            <pc:sldMk cId="1916691901" sldId="258"/>
+            <ac:cxnSpMk id="21" creationId="{7E7C77BC-7138-40B1-A15B-20F57A494629}"/>
+          </ac:cxnSpMkLst>
+        </pc:cxnChg>
+        <pc:cxnChg chg="add">
+          <ac:chgData name="Alexis PHELIPPON" userId="10a659cf0343d5b5" providerId="LiveId" clId="{C06D141E-A32E-47A3-953C-037F78B3363B}" dt="2020-02-13T06:52:13.206" v="161" actId="26606"/>
+          <ac:cxnSpMkLst>
+            <pc:docMk/>
+            <pc:sldMk cId="1916691901" sldId="258"/>
+            <ac:cxnSpMk id="23" creationId="{DB146403-F3D6-484B-B2ED-97F9565D0370}"/>
+          </ac:cxnSpMkLst>
+        </pc:cxnChg>
+      </pc:sldChg>
+      <pc:sldChg chg="addSp delSp modSp">
+        <pc:chgData name="Alexis PHELIPPON" userId="10a659cf0343d5b5" providerId="LiveId" clId="{C06D141E-A32E-47A3-953C-037F78B3363B}" dt="2020-02-13T06:59:33.065" v="211" actId="26606"/>
+        <pc:sldMkLst>
+          <pc:docMk/>
+          <pc:sldMk cId="2953165643" sldId="260"/>
+        </pc:sldMkLst>
+        <pc:spChg chg="mod">
+          <ac:chgData name="Alexis PHELIPPON" userId="10a659cf0343d5b5" providerId="LiveId" clId="{C06D141E-A32E-47A3-953C-037F78B3363B}" dt="2020-02-13T06:59:33.065" v="211" actId="26606"/>
+          <ac:spMkLst>
+            <pc:docMk/>
+            <pc:sldMk cId="2953165643" sldId="260"/>
+            <ac:spMk id="2" creationId="{86C27520-AB4B-489A-90C1-8DEA9B640FB0}"/>
+          </ac:spMkLst>
+        </pc:spChg>
+        <pc:spChg chg="del">
+          <ac:chgData name="Alexis PHELIPPON" userId="10a659cf0343d5b5" providerId="LiveId" clId="{C06D141E-A32E-47A3-953C-037F78B3363B}" dt="2020-02-13T06:59:33.065" v="211" actId="26606"/>
+          <ac:spMkLst>
+            <pc:docMk/>
+            <pc:sldMk cId="2953165643" sldId="260"/>
+            <ac:spMk id="11" creationId="{823AC064-BC96-4F32-8AE1-B2FD38754823}"/>
+          </ac:spMkLst>
+        </pc:spChg>
+        <pc:spChg chg="add">
+          <ac:chgData name="Alexis PHELIPPON" userId="10a659cf0343d5b5" providerId="LiveId" clId="{C06D141E-A32E-47A3-953C-037F78B3363B}" dt="2020-02-13T06:59:33.065" v="211" actId="26606"/>
+          <ac:spMkLst>
+            <pc:docMk/>
+            <pc:sldMk cId="2953165643" sldId="260"/>
+            <ac:spMk id="20" creationId="{FDC05A7B-3060-4D55-AD98-5814F79D46C2}"/>
+          </ac:spMkLst>
+        </pc:spChg>
+        <pc:spChg chg="add">
+          <ac:chgData name="Alexis PHELIPPON" userId="10a659cf0343d5b5" providerId="LiveId" clId="{C06D141E-A32E-47A3-953C-037F78B3363B}" dt="2020-02-13T06:59:33.065" v="211" actId="26606"/>
+          <ac:spMkLst>
+            <pc:docMk/>
+            <pc:sldMk cId="2953165643" sldId="260"/>
+            <ac:spMk id="22" creationId="{A3473CF9-37EB-43E7-89EF-D2D1C53D1DAC}"/>
+          </ac:spMkLst>
+        </pc:spChg>
+        <pc:spChg chg="add">
+          <ac:chgData name="Alexis PHELIPPON" userId="10a659cf0343d5b5" providerId="LiveId" clId="{C06D141E-A32E-47A3-953C-037F78B3363B}" dt="2020-02-13T06:59:33.065" v="211" actId="26606"/>
+          <ac:spMkLst>
+            <pc:docMk/>
+            <pc:sldMk cId="2953165643" sldId="260"/>
+            <ac:spMk id="24" creationId="{586B4EF9-43BA-4655-A6FF-1D8E21574C95}"/>
+          </ac:spMkLst>
+        </pc:spChg>
+        <pc:picChg chg="add mod">
+          <ac:chgData name="Alexis PHELIPPON" userId="10a659cf0343d5b5" providerId="LiveId" clId="{C06D141E-A32E-47A3-953C-037F78B3363B}" dt="2020-02-13T06:59:33.065" v="211" actId="26606"/>
+          <ac:picMkLst>
+            <pc:docMk/>
+            <pc:sldMk cId="2953165643" sldId="260"/>
+            <ac:picMk id="4" creationId="{1BCC562F-344E-4768-8E0E-AF13687ECED4}"/>
+          </ac:picMkLst>
+        </pc:picChg>
+        <pc:picChg chg="mod ord">
+          <ac:chgData name="Alexis PHELIPPON" userId="10a659cf0343d5b5" providerId="LiveId" clId="{C06D141E-A32E-47A3-953C-037F78B3363B}" dt="2020-02-13T06:59:33.065" v="211" actId="26606"/>
+          <ac:picMkLst>
+            <pc:docMk/>
+            <pc:sldMk cId="2953165643" sldId="260"/>
+            <ac:picMk id="5" creationId="{67D4C53C-DD5C-43BC-837F-D21326BD5617}"/>
+          </ac:picMkLst>
+        </pc:picChg>
+        <pc:picChg chg="mod">
+          <ac:chgData name="Alexis PHELIPPON" userId="10a659cf0343d5b5" providerId="LiveId" clId="{C06D141E-A32E-47A3-953C-037F78B3363B}" dt="2020-02-13T06:59:33.065" v="211" actId="26606"/>
+          <ac:picMkLst>
+            <pc:docMk/>
+            <pc:sldMk cId="2953165643" sldId="260"/>
+            <ac:picMk id="7" creationId="{BE7AB0DB-E00D-41EC-A391-D572B13B363C}"/>
+          </ac:picMkLst>
+        </pc:picChg>
+        <pc:cxnChg chg="del">
+          <ac:chgData name="Alexis PHELIPPON" userId="10a659cf0343d5b5" providerId="LiveId" clId="{C06D141E-A32E-47A3-953C-037F78B3363B}" dt="2020-02-13T06:59:33.065" v="211" actId="26606"/>
+          <ac:cxnSpMkLst>
+            <pc:docMk/>
+            <pc:sldMk cId="2953165643" sldId="260"/>
+            <ac:cxnSpMk id="13" creationId="{7E7C77BC-7138-40B1-A15B-20F57A494629}"/>
+          </ac:cxnSpMkLst>
+        </pc:cxnChg>
+        <pc:cxnChg chg="del">
+          <ac:chgData name="Alexis PHELIPPON" userId="10a659cf0343d5b5" providerId="LiveId" clId="{C06D141E-A32E-47A3-953C-037F78B3363B}" dt="2020-02-13T06:59:33.065" v="211" actId="26606"/>
+          <ac:cxnSpMkLst>
+            <pc:docMk/>
+            <pc:sldMk cId="2953165643" sldId="260"/>
+            <ac:cxnSpMk id="15" creationId="{DB146403-F3D6-484B-B2ED-97F9565D0370}"/>
+          </ac:cxnSpMkLst>
+        </pc:cxnChg>
+      </pc:sldChg>
+      <pc:sldChg chg="addSp delSp modSp mod setBg">
+        <pc:chgData name="Alexis PHELIPPON" userId="10a659cf0343d5b5" providerId="LiveId" clId="{C06D141E-A32E-47A3-953C-037F78B3363B}" dt="2020-02-13T06:56:55.997" v="207" actId="20577"/>
+        <pc:sldMkLst>
+          <pc:docMk/>
+          <pc:sldMk cId="2351229625" sldId="261"/>
+        </pc:sldMkLst>
+        <pc:spChg chg="mod">
+          <ac:chgData name="Alexis PHELIPPON" userId="10a659cf0343d5b5" providerId="LiveId" clId="{C06D141E-A32E-47A3-953C-037F78B3363B}" dt="2020-02-13T06:56:55.997" v="207" actId="20577"/>
+          <ac:spMkLst>
+            <pc:docMk/>
+            <pc:sldMk cId="2351229625" sldId="261"/>
+            <ac:spMk id="2" creationId="{D615FD43-FF00-4FED-80FC-F50F4E9E0781}"/>
+          </ac:spMkLst>
+        </pc:spChg>
+        <pc:spChg chg="del">
+          <ac:chgData name="Alexis PHELIPPON" userId="10a659cf0343d5b5" providerId="LiveId" clId="{C06D141E-A32E-47A3-953C-037F78B3363B}" dt="2020-02-13T06:45:39.254" v="0" actId="478"/>
+          <ac:spMkLst>
+            <pc:docMk/>
+            <pc:sldMk cId="2351229625" sldId="261"/>
+            <ac:spMk id="3" creationId="{7B619DEF-95BA-492B-9043-3E5CE32104D5}"/>
+          </ac:spMkLst>
+        </pc:spChg>
+        <pc:spChg chg="add mod">
+          <ac:chgData name="Alexis PHELIPPON" userId="10a659cf0343d5b5" providerId="LiveId" clId="{C06D141E-A32E-47A3-953C-037F78B3363B}" dt="2020-02-13T06:49:50.693" v="99" actId="26606"/>
+          <ac:spMkLst>
+            <pc:docMk/>
+            <pc:sldMk cId="2351229625" sldId="261"/>
+            <ac:spMk id="5" creationId="{B512AD71-4C3C-4C4D-A4E3-37529BE31B60}"/>
+          </ac:spMkLst>
+        </pc:spChg>
+        <pc:spChg chg="add">
+          <ac:chgData name="Alexis PHELIPPON" userId="10a659cf0343d5b5" providerId="LiveId" clId="{C06D141E-A32E-47A3-953C-037F78B3363B}" dt="2020-02-13T06:49:50.693" v="99" actId="26606"/>
+          <ac:spMkLst>
+            <pc:docMk/>
+            <pc:sldMk cId="2351229625" sldId="261"/>
+            <ac:spMk id="7" creationId="{C1A1C5D3-C053-4EE9-BE1A-419B6E27CCAE}"/>
+          </ac:spMkLst>
+        </pc:spChg>
+        <pc:spChg chg="add">
+          <ac:chgData name="Alexis PHELIPPON" userId="10a659cf0343d5b5" providerId="LiveId" clId="{C06D141E-A32E-47A3-953C-037F78B3363B}" dt="2020-02-13T06:49:50.693" v="99" actId="26606"/>
+          <ac:spMkLst>
+            <pc:docMk/>
+            <pc:sldMk cId="2351229625" sldId="261"/>
+            <ac:spMk id="8" creationId="{A3473CF9-37EB-43E7-89EF-D2D1C53D1DAC}"/>
+          </ac:spMkLst>
+        </pc:spChg>
+        <pc:spChg chg="add">
+          <ac:chgData name="Alexis PHELIPPON" userId="10a659cf0343d5b5" providerId="LiveId" clId="{C06D141E-A32E-47A3-953C-037F78B3363B}" dt="2020-02-13T06:49:50.693" v="99" actId="26606"/>
+          <ac:spMkLst>
+            <pc:docMk/>
+            <pc:sldMk cId="2351229625" sldId="261"/>
+            <ac:spMk id="9" creationId="{586B4EF9-43BA-4655-A6FF-1D8E21574C95}"/>
+          </ac:spMkLst>
+        </pc:spChg>
+        <pc:spChg chg="add del">
+          <ac:chgData name="Alexis PHELIPPON" userId="10a659cf0343d5b5" providerId="LiveId" clId="{C06D141E-A32E-47A3-953C-037F78B3363B}" dt="2020-02-13T06:49:34.439" v="96" actId="26606"/>
+          <ac:spMkLst>
+            <pc:docMk/>
+            <pc:sldMk cId="2351229625" sldId="261"/>
+            <ac:spMk id="10" creationId="{50A3C1AB-1153-42D2-8378-34B849C1C4B6}"/>
+          </ac:spMkLst>
+        </pc:spChg>
+        <pc:spChg chg="add del">
+          <ac:chgData name="Alexis PHELIPPON" userId="10a659cf0343d5b5" providerId="LiveId" clId="{C06D141E-A32E-47A3-953C-037F78B3363B}" dt="2020-02-13T06:49:34.439" v="96" actId="26606"/>
+          <ac:spMkLst>
+            <pc:docMk/>
+            <pc:sldMk cId="2351229625" sldId="261"/>
+            <ac:spMk id="12" creationId="{A3473CF9-37EB-43E7-89EF-D2D1C53D1DAC}"/>
+          </ac:spMkLst>
+        </pc:spChg>
+        <pc:spChg chg="add del">
+          <ac:chgData name="Alexis PHELIPPON" userId="10a659cf0343d5b5" providerId="LiveId" clId="{C06D141E-A32E-47A3-953C-037F78B3363B}" dt="2020-02-13T06:49:34.439" v="96" actId="26606"/>
+          <ac:spMkLst>
+            <pc:docMk/>
+            <pc:sldMk cId="2351229625" sldId="261"/>
+            <ac:spMk id="14" creationId="{586B4EF9-43BA-4655-A6FF-1D8E21574C95}"/>
+          </ac:spMkLst>
+        </pc:spChg>
+        <pc:picChg chg="add mod ord">
+          <ac:chgData name="Alexis PHELIPPON" userId="10a659cf0343d5b5" providerId="LiveId" clId="{C06D141E-A32E-47A3-953C-037F78B3363B}" dt="2020-02-13T06:49:50.693" v="99" actId="26606"/>
+          <ac:picMkLst>
+            <pc:docMk/>
+            <pc:sldMk cId="2351229625" sldId="261"/>
+            <ac:picMk id="4" creationId="{E077906D-DC6D-459C-A998-41039196AC04}"/>
+          </ac:picMkLst>
+        </pc:picChg>
+      </pc:sldChg>
+      <pc:sldChg chg="modSp">
+        <pc:chgData name="Alexis PHELIPPON" userId="10a659cf0343d5b5" providerId="LiveId" clId="{C06D141E-A32E-47A3-953C-037F78B3363B}" dt="2020-02-13T06:50:14.525" v="100" actId="20577"/>
+        <pc:sldMkLst>
+          <pc:docMk/>
+          <pc:sldMk cId="1589546123" sldId="263"/>
+        </pc:sldMkLst>
+        <pc:spChg chg="mod">
+          <ac:chgData name="Alexis PHELIPPON" userId="10a659cf0343d5b5" providerId="LiveId" clId="{C06D141E-A32E-47A3-953C-037F78B3363B}" dt="2020-02-13T06:50:14.525" v="100" actId="20577"/>
+          <ac:spMkLst>
+            <pc:docMk/>
+            <pc:sldMk cId="1589546123" sldId="263"/>
+            <ac:spMk id="3" creationId="{30D24A21-DEAA-4231-9119-E12B98F29A78}"/>
+          </ac:spMkLst>
+        </pc:spChg>
+      </pc:sldChg>
+      <pc:sldChg chg="addSp delSp modSp add mod setBg">
+        <pc:chgData name="Alexis PHELIPPON" userId="10a659cf0343d5b5" providerId="LiveId" clId="{C06D141E-A32E-47A3-953C-037F78B3363B}" dt="2020-02-13T06:49:02.198" v="92" actId="26606"/>
+        <pc:sldMkLst>
+          <pc:docMk/>
+          <pc:sldMk cId="627470338" sldId="264"/>
+        </pc:sldMkLst>
+        <pc:spChg chg="mod ord">
+          <ac:chgData name="Alexis PHELIPPON" userId="10a659cf0343d5b5" providerId="LiveId" clId="{C06D141E-A32E-47A3-953C-037F78B3363B}" dt="2020-02-13T06:49:02.198" v="92" actId="26606"/>
+          <ac:spMkLst>
+            <pc:docMk/>
+            <pc:sldMk cId="627470338" sldId="264"/>
+            <ac:spMk id="2" creationId="{5EA320D7-55F1-418D-9A5D-A4CDB0AB775D}"/>
+          </ac:spMkLst>
+        </pc:spChg>
+        <pc:spChg chg="del">
+          <ac:chgData name="Alexis PHELIPPON" userId="10a659cf0343d5b5" providerId="LiveId" clId="{C06D141E-A32E-47A3-953C-037F78B3363B}" dt="2020-02-13T06:48:23.374" v="68"/>
+          <ac:spMkLst>
+            <pc:docMk/>
+            <pc:sldMk cId="627470338" sldId="264"/>
+            <ac:spMk id="3" creationId="{2FA46ABE-013C-40F3-9D3C-DF680C706915}"/>
+          </ac:spMkLst>
+        </pc:spChg>
+        <pc:spChg chg="add">
+          <ac:chgData name="Alexis PHELIPPON" userId="10a659cf0343d5b5" providerId="LiveId" clId="{C06D141E-A32E-47A3-953C-037F78B3363B}" dt="2020-02-13T06:49:02.198" v="92" actId="26606"/>
+          <ac:spMkLst>
+            <pc:docMk/>
+            <pc:sldMk cId="627470338" sldId="264"/>
+            <ac:spMk id="9" creationId="{155D7866-985D-4D23-BF0E-72CA30F5C7E9}"/>
+          </ac:spMkLst>
+        </pc:spChg>
+        <pc:spChg chg="add">
+          <ac:chgData name="Alexis PHELIPPON" userId="10a659cf0343d5b5" providerId="LiveId" clId="{C06D141E-A32E-47A3-953C-037F78B3363B}" dt="2020-02-13T06:49:02.198" v="92" actId="26606"/>
+          <ac:spMkLst>
+            <pc:docMk/>
+            <pc:sldMk cId="627470338" sldId="264"/>
+            <ac:spMk id="11" creationId="{0ADDB668-2CA4-4D2B-9C34-3487CA330BA8}"/>
+          </ac:spMkLst>
+        </pc:spChg>
+        <pc:spChg chg="add">
+          <ac:chgData name="Alexis PHELIPPON" userId="10a659cf0343d5b5" providerId="LiveId" clId="{C06D141E-A32E-47A3-953C-037F78B3363B}" dt="2020-02-13T06:49:02.198" v="92" actId="26606"/>
+          <ac:spMkLst>
+            <pc:docMk/>
+            <pc:sldMk cId="627470338" sldId="264"/>
+            <ac:spMk id="13" creationId="{2568BC19-F052-4108-93E1-6A3D1DEC072F}"/>
+          </ac:spMkLst>
+        </pc:spChg>
+        <pc:spChg chg="add">
+          <ac:chgData name="Alexis PHELIPPON" userId="10a659cf0343d5b5" providerId="LiveId" clId="{C06D141E-A32E-47A3-953C-037F78B3363B}" dt="2020-02-13T06:49:02.198" v="92" actId="26606"/>
+          <ac:spMkLst>
+            <pc:docMk/>
+            <pc:sldMk cId="627470338" sldId="264"/>
+            <ac:spMk id="15" creationId="{D5FD337D-4D6B-4C8B-B6F5-121097E09881}"/>
+          </ac:spMkLst>
+        </pc:spChg>
+        <pc:picChg chg="add mod">
+          <ac:chgData name="Alexis PHELIPPON" userId="10a659cf0343d5b5" providerId="LiveId" clId="{C06D141E-A32E-47A3-953C-037F78B3363B}" dt="2020-02-13T06:49:02.198" v="92" actId="26606"/>
+          <ac:picMkLst>
+            <pc:docMk/>
+            <pc:sldMk cId="627470338" sldId="264"/>
+            <ac:picMk id="4" creationId="{E79FBC81-AFC6-4033-BE21-688D938C6236}"/>
+          </ac:picMkLst>
+        </pc:picChg>
+      </pc:sldChg>
+      <pc:sldChg chg="addSp delSp modSp add mod ord setBg">
+        <pc:chgData name="Alexis PHELIPPON" userId="10a659cf0343d5b5" providerId="LiveId" clId="{C06D141E-A32E-47A3-953C-037F78B3363B}" dt="2020-02-13T07:08:00.379" v="426"/>
+        <pc:sldMkLst>
+          <pc:docMk/>
+          <pc:sldMk cId="3580276011" sldId="265"/>
+        </pc:sldMkLst>
+        <pc:spChg chg="mod ord">
+          <ac:chgData name="Alexis PHELIPPON" userId="10a659cf0343d5b5" providerId="LiveId" clId="{C06D141E-A32E-47A3-953C-037F78B3363B}" dt="2020-02-13T06:56:28.295" v="186" actId="26606"/>
+          <ac:spMkLst>
+            <pc:docMk/>
+            <pc:sldMk cId="3580276011" sldId="265"/>
+            <ac:spMk id="2" creationId="{E94A1F19-2D5E-45F0-9D78-2E199359DC41}"/>
+          </ac:spMkLst>
+        </pc:spChg>
+        <pc:spChg chg="del">
+          <ac:chgData name="Alexis PHELIPPON" userId="10a659cf0343d5b5" providerId="LiveId" clId="{C06D141E-A32E-47A3-953C-037F78B3363B}" dt="2020-02-13T06:56:19.915" v="185"/>
+          <ac:spMkLst>
+            <pc:docMk/>
+            <pc:sldMk cId="3580276011" sldId="265"/>
+            <ac:spMk id="3" creationId="{9F84E630-61A6-41E2-823E-B97F90BECE1B}"/>
+          </ac:spMkLst>
+        </pc:spChg>
+        <pc:spChg chg="add">
+          <ac:chgData name="Alexis PHELIPPON" userId="10a659cf0343d5b5" providerId="LiveId" clId="{C06D141E-A32E-47A3-953C-037F78B3363B}" dt="2020-02-13T06:56:28.295" v="186" actId="26606"/>
+          <ac:spMkLst>
+            <pc:docMk/>
+            <pc:sldMk cId="3580276011" sldId="265"/>
+            <ac:spMk id="9" creationId="{155D7866-985D-4D23-BF0E-72CA30F5C7E9}"/>
+          </ac:spMkLst>
+        </pc:spChg>
+        <pc:spChg chg="add">
+          <ac:chgData name="Alexis PHELIPPON" userId="10a659cf0343d5b5" providerId="LiveId" clId="{C06D141E-A32E-47A3-953C-037F78B3363B}" dt="2020-02-13T06:56:28.295" v="186" actId="26606"/>
+          <ac:spMkLst>
+            <pc:docMk/>
+            <pc:sldMk cId="3580276011" sldId="265"/>
+            <ac:spMk id="11" creationId="{0ADDB668-2CA4-4D2B-9C34-3487CA330BA8}"/>
+          </ac:spMkLst>
+        </pc:spChg>
+        <pc:spChg chg="add">
+          <ac:chgData name="Alexis PHELIPPON" userId="10a659cf0343d5b5" providerId="LiveId" clId="{C06D141E-A32E-47A3-953C-037F78B3363B}" dt="2020-02-13T06:56:28.295" v="186" actId="26606"/>
+          <ac:spMkLst>
+            <pc:docMk/>
+            <pc:sldMk cId="3580276011" sldId="265"/>
+            <ac:spMk id="13" creationId="{2568BC19-F052-4108-93E1-6A3D1DEC072F}"/>
+          </ac:spMkLst>
+        </pc:spChg>
+        <pc:spChg chg="add">
+          <ac:chgData name="Alexis PHELIPPON" userId="10a659cf0343d5b5" providerId="LiveId" clId="{C06D141E-A32E-47A3-953C-037F78B3363B}" dt="2020-02-13T06:56:28.295" v="186" actId="26606"/>
+          <ac:spMkLst>
+            <pc:docMk/>
+            <pc:sldMk cId="3580276011" sldId="265"/>
+            <ac:spMk id="15" creationId="{D5FD337D-4D6B-4C8B-B6F5-121097E09881}"/>
+          </ac:spMkLst>
+        </pc:spChg>
+        <pc:picChg chg="add mod">
+          <ac:chgData name="Alexis PHELIPPON" userId="10a659cf0343d5b5" providerId="LiveId" clId="{C06D141E-A32E-47A3-953C-037F78B3363B}" dt="2020-02-13T06:56:28.295" v="186" actId="26606"/>
+          <ac:picMkLst>
+            <pc:docMk/>
+            <pc:sldMk cId="3580276011" sldId="265"/>
+            <ac:picMk id="4" creationId="{55B38CD1-5869-4D7F-8018-6A00CD70C7CE}"/>
+          </ac:picMkLst>
+        </pc:picChg>
+      </pc:sldChg>
+      <pc:sldChg chg="addSp modSp add mod setBg">
+        <pc:chgData name="Alexis PHELIPPON" userId="10a659cf0343d5b5" providerId="LiveId" clId="{C06D141E-A32E-47A3-953C-037F78B3363B}" dt="2020-02-13T07:08:07.293" v="427" actId="27614"/>
+        <pc:sldMkLst>
+          <pc:docMk/>
+          <pc:sldMk cId="311270466" sldId="266"/>
+        </pc:sldMkLst>
+        <pc:spChg chg="mod">
+          <ac:chgData name="Alexis PHELIPPON" userId="10a659cf0343d5b5" providerId="LiveId" clId="{C06D141E-A32E-47A3-953C-037F78B3363B}" dt="2020-02-13T07:07:49.973" v="424" actId="26606"/>
+          <ac:spMkLst>
+            <pc:docMk/>
+            <pc:sldMk cId="311270466" sldId="266"/>
+            <ac:spMk id="2" creationId="{07EDE9AA-6986-4D30-BE5A-7DAC82BC1CC8}"/>
+          </ac:spMkLst>
+        </pc:spChg>
+        <pc:spChg chg="mod">
+          <ac:chgData name="Alexis PHELIPPON" userId="10a659cf0343d5b5" providerId="LiveId" clId="{C06D141E-A32E-47A3-953C-037F78B3363B}" dt="2020-02-13T07:07:49.973" v="424" actId="26606"/>
+          <ac:spMkLst>
+            <pc:docMk/>
+            <pc:sldMk cId="311270466" sldId="266"/>
+            <ac:spMk id="3" creationId="{7DF2BE44-19FA-4F51-9962-B921993F5895}"/>
+          </ac:spMkLst>
+        </pc:spChg>
+        <pc:spChg chg="add">
+          <ac:chgData name="Alexis PHELIPPON" userId="10a659cf0343d5b5" providerId="LiveId" clId="{C06D141E-A32E-47A3-953C-037F78B3363B}" dt="2020-02-13T07:07:49.973" v="424" actId="26606"/>
+          <ac:spMkLst>
+            <pc:docMk/>
+            <pc:sldMk cId="311270466" sldId="266"/>
+            <ac:spMk id="9" creationId="{8380AD67-C5CA-4918-B4BB-C359BB03EEDD}"/>
+          </ac:spMkLst>
+        </pc:spChg>
+        <pc:spChg chg="add">
+          <ac:chgData name="Alexis PHELIPPON" userId="10a659cf0343d5b5" providerId="LiveId" clId="{C06D141E-A32E-47A3-953C-037F78B3363B}" dt="2020-02-13T07:07:49.973" v="424" actId="26606"/>
+          <ac:spMkLst>
+            <pc:docMk/>
+            <pc:sldMk cId="311270466" sldId="266"/>
+            <ac:spMk id="11" creationId="{EABAD4DA-87BA-4F70-9EF0-45C6BCF17823}"/>
+          </ac:spMkLst>
+        </pc:spChg>
+        <pc:spChg chg="add">
+          <ac:chgData name="Alexis PHELIPPON" userId="10a659cf0343d5b5" providerId="LiveId" clId="{C06D141E-A32E-47A3-953C-037F78B3363B}" dt="2020-02-13T07:07:49.973" v="424" actId="26606"/>
+          <ac:spMkLst>
+            <pc:docMk/>
+            <pc:sldMk cId="311270466" sldId="266"/>
+            <ac:spMk id="13" creationId="{915128D9-2797-47FA-B6FE-EC24E6B8437A}"/>
+          </ac:spMkLst>
+        </pc:spChg>
+        <pc:picChg chg="add mod">
+          <ac:chgData name="Alexis PHELIPPON" userId="10a659cf0343d5b5" providerId="LiveId" clId="{C06D141E-A32E-47A3-953C-037F78B3363B}" dt="2020-02-13T07:08:07.293" v="427" actId="27614"/>
+          <ac:picMkLst>
+            <pc:docMk/>
+            <pc:sldMk cId="311270466" sldId="266"/>
+            <ac:picMk id="5" creationId="{5C626E19-DBD6-424A-AD76-75F25E99D7D2}"/>
+          </ac:picMkLst>
+        </pc:picChg>
+      </pc:sldChg>
+      <pc:sldChg chg="addSp delSp modSp add mod setBg setClrOvrMap">
+        <pc:chgData name="Alexis PHELIPPON" userId="10a659cf0343d5b5" providerId="LiveId" clId="{C06D141E-A32E-47A3-953C-037F78B3363B}" dt="2020-02-13T07:10:50.585" v="486" actId="1076"/>
+        <pc:sldMkLst>
+          <pc:docMk/>
+          <pc:sldMk cId="2115081749" sldId="267"/>
+        </pc:sldMkLst>
+        <pc:spChg chg="mod">
+          <ac:chgData name="Alexis PHELIPPON" userId="10a659cf0343d5b5" providerId="LiveId" clId="{C06D141E-A32E-47A3-953C-037F78B3363B}" dt="2020-02-13T07:10:34.982" v="483" actId="122"/>
+          <ac:spMkLst>
+            <pc:docMk/>
+            <pc:sldMk cId="2115081749" sldId="267"/>
+            <ac:spMk id="2" creationId="{EF2FAC93-169D-48B4-BD8E-6C9E8AE13CB9}"/>
+          </ac:spMkLst>
+        </pc:spChg>
+        <pc:spChg chg="mod">
+          <ac:chgData name="Alexis PHELIPPON" userId="10a659cf0343d5b5" providerId="LiveId" clId="{C06D141E-A32E-47A3-953C-037F78B3363B}" dt="2020-02-13T07:10:50.585" v="486" actId="1076"/>
+          <ac:spMkLst>
+            <pc:docMk/>
+            <pc:sldMk cId="2115081749" sldId="267"/>
+            <ac:spMk id="3" creationId="{21E8835C-4BEC-40AD-9628-2C007E024F67}"/>
+          </ac:spMkLst>
+        </pc:spChg>
+        <pc:spChg chg="add del">
+          <ac:chgData name="Alexis PHELIPPON" userId="10a659cf0343d5b5" providerId="LiveId" clId="{C06D141E-A32E-47A3-953C-037F78B3363B}" dt="2020-02-13T07:10:21.406" v="481" actId="26606"/>
+          <ac:spMkLst>
+            <pc:docMk/>
+            <pc:sldMk cId="2115081749" sldId="267"/>
+            <ac:spMk id="9" creationId="{79477870-C64A-4E35-8F2F-05B7114F3C74}"/>
+          </ac:spMkLst>
+        </pc:spChg>
+        <pc:spChg chg="add del">
+          <ac:chgData name="Alexis PHELIPPON" userId="10a659cf0343d5b5" providerId="LiveId" clId="{C06D141E-A32E-47A3-953C-037F78B3363B}" dt="2020-02-13T07:10:21.406" v="481" actId="26606"/>
+          <ac:spMkLst>
+            <pc:docMk/>
+            <pc:sldMk cId="2115081749" sldId="267"/>
+            <ac:spMk id="11" creationId="{8AEA628B-C8FF-4D0B-B111-F101F580B15D}"/>
+          </ac:spMkLst>
+        </pc:spChg>
+        <pc:spChg chg="add del">
+          <ac:chgData name="Alexis PHELIPPON" userId="10a659cf0343d5b5" providerId="LiveId" clId="{C06D141E-A32E-47A3-953C-037F78B3363B}" dt="2020-02-13T07:10:21.406" v="481" actId="26606"/>
+          <ac:spMkLst>
+            <pc:docMk/>
+            <pc:sldMk cId="2115081749" sldId="267"/>
+            <ac:spMk id="13" creationId="{42663BD0-064C-40FC-A331-F49FCA9536AA}"/>
+          </ac:spMkLst>
+        </pc:spChg>
+        <pc:spChg chg="add">
+          <ac:chgData name="Alexis PHELIPPON" userId="10a659cf0343d5b5" providerId="LiveId" clId="{C06D141E-A32E-47A3-953C-037F78B3363B}" dt="2020-02-13T07:10:21.406" v="481" actId="26606"/>
+          <ac:spMkLst>
+            <pc:docMk/>
+            <pc:sldMk cId="2115081749" sldId="267"/>
+            <ac:spMk id="18" creationId="{1DB7C82F-AB7E-4F0C-B829-FA1B9C415180}"/>
+          </ac:spMkLst>
+        </pc:spChg>
+        <pc:picChg chg="add mod">
+          <ac:chgData name="Alexis PHELIPPON" userId="10a659cf0343d5b5" providerId="LiveId" clId="{C06D141E-A32E-47A3-953C-037F78B3363B}" dt="2020-02-13T07:10:21.406" v="481" actId="26606"/>
+          <ac:picMkLst>
+            <pc:docMk/>
+            <pc:sldMk cId="2115081749" sldId="267"/>
+            <ac:picMk id="5" creationId="{07FC3549-0A68-45F5-B3E5-45DA3BFB9C22}"/>
+          </ac:picMkLst>
+        </pc:picChg>
       </pc:sldChg>
     </pc:docChg>
   </pc:docChgLst>
@@ -8046,6 +8580,789 @@
 </p:sld>
 </file>
 
+<file path=ppt/slides/slide10.xml><?xml version="1.0" encoding="utf-8"?>
+<p:sld xmlns:a="http://schemas.openxmlformats.org/drawingml/2006/main" xmlns:r="http://schemas.openxmlformats.org/officeDocument/2006/relationships" xmlns:p="http://schemas.openxmlformats.org/presentationml/2006/main">
+  <p:cSld>
+    <p:bg>
+      <p:bgPr>
+        <a:solidFill>
+          <a:schemeClr val="bg1"/>
+        </a:solidFill>
+        <a:effectLst/>
+      </p:bgPr>
+    </p:bg>
+    <p:spTree>
+      <p:nvGrpSpPr>
+        <p:cNvPr id="1" name=""/>
+        <p:cNvGrpSpPr/>
+        <p:nvPr/>
+      </p:nvGrpSpPr>
+      <p:grpSpPr>
+        <a:xfrm>
+          <a:off x="0" y="0"/>
+          <a:ext cx="0" cy="0"/>
+          <a:chOff x="0" y="0"/>
+          <a:chExt cx="0" cy="0"/>
+        </a:xfrm>
+      </p:grpSpPr>
+      <p:sp useBgFill="1">
+        <p:nvSpPr>
+          <p:cNvPr id="9" name="Rectangle 8">
+            <a:extLst>
+              <a:ext uri="{FF2B5EF4-FFF2-40B4-BE49-F238E27FC236}">
+                <a16:creationId xmlns:a16="http://schemas.microsoft.com/office/drawing/2014/main" id="{8380AD67-C5CA-4918-B4BB-C359BB03EEDD}"/>
+              </a:ext>
+              <a:ext uri="{C183D7F6-B498-43B3-948B-1728B52AA6E4}">
+                <adec:decorative xmlns:adec="http://schemas.microsoft.com/office/drawing/2017/decorative" val="1"/>
+              </a:ext>
+            </a:extLst>
+          </p:cNvPr>
+          <p:cNvSpPr>
+            <a:spLocks noGrp="1" noRot="1" noChangeAspect="1" noMove="1" noResize="1" noEditPoints="1" noAdjustHandles="1" noChangeArrowheads="1" noChangeShapeType="1" noTextEdit="1"/>
+          </p:cNvSpPr>
+          <p:nvPr>
+            <p:extLst>
+              <p:ext uri="{386F3935-93C4-4BCD-93E2-E3B085C9AB24}">
+                <p16:designElem xmlns:p16="http://schemas.microsoft.com/office/powerpoint/2015/main" val="1"/>
+              </p:ext>
+            </p:extLst>
+          </p:nvPr>
+        </p:nvSpPr>
+        <p:spPr>
+          <a:xfrm>
+            <a:off x="0" y="0"/>
+            <a:ext cx="12192000" cy="6858000"/>
+          </a:xfrm>
+          <a:prstGeom prst="rect">
+            <a:avLst/>
+          </a:prstGeom>
+          <a:ln>
+            <a:noFill/>
+          </a:ln>
+        </p:spPr>
+        <p:style>
+          <a:lnRef idx="2">
+            <a:schemeClr val="accent1">
+              <a:shade val="50000"/>
+            </a:schemeClr>
+          </a:lnRef>
+          <a:fillRef idx="1">
+            <a:schemeClr val="accent1"/>
+          </a:fillRef>
+          <a:effectRef idx="0">
+            <a:schemeClr val="accent1"/>
+          </a:effectRef>
+          <a:fontRef idx="minor">
+            <a:schemeClr val="lt1"/>
+          </a:fontRef>
+        </p:style>
+        <p:txBody>
+          <a:bodyPr rtlCol="0" anchor="ctr"/>
+          <a:lstStyle/>
+          <a:p>
+            <a:pPr algn="ctr"/>
+            <a:endParaRPr lang="en-US"/>
+          </a:p>
+        </p:txBody>
+      </p:sp>
+      <p:sp>
+        <p:nvSpPr>
+          <p:cNvPr id="2" name="Titre 1">
+            <a:extLst>
+              <a:ext uri="{FF2B5EF4-FFF2-40B4-BE49-F238E27FC236}">
+                <a16:creationId xmlns:a16="http://schemas.microsoft.com/office/drawing/2014/main" id="{07EDE9AA-6986-4D30-BE5A-7DAC82BC1CC8}"/>
+              </a:ext>
+            </a:extLst>
+          </p:cNvPr>
+          <p:cNvSpPr>
+            <a:spLocks noGrp="1"/>
+          </p:cNvSpPr>
+          <p:nvPr>
+            <p:ph type="title"/>
+          </p:nvPr>
+        </p:nvSpPr>
+        <p:spPr>
+          <a:xfrm>
+            <a:off x="5080216" y="1076324"/>
+            <a:ext cx="6272784" cy="1535051"/>
+          </a:xfrm>
+        </p:spPr>
+        <p:txBody>
+          <a:bodyPr anchor="b">
+            <a:normAutofit/>
+          </a:bodyPr>
+          <a:lstStyle/>
+          <a:p>
+            <a:r>
+              <a:rPr lang="fr-FR" sz="5200"/>
+              <a:t>Évolution des compétences</a:t>
+            </a:r>
+          </a:p>
+        </p:txBody>
+      </p:sp>
+      <p:pic>
+        <p:nvPicPr>
+          <p:cNvPr id="5" name="Picture 4" descr="Une image contenant lumière&#10;&#10;Description générée automatiquement">
+            <a:extLst>
+              <a:ext uri="{FF2B5EF4-FFF2-40B4-BE49-F238E27FC236}">
+                <a16:creationId xmlns:a16="http://schemas.microsoft.com/office/drawing/2014/main" id="{5C626E19-DBD6-424A-AD76-75F25E99D7D2}"/>
+              </a:ext>
+            </a:extLst>
+          </p:cNvPr>
+          <p:cNvPicPr>
+            <a:picLocks noChangeAspect="1"/>
+          </p:cNvPicPr>
+          <p:nvPr/>
+        </p:nvPicPr>
+        <p:blipFill rotWithShape="1">
+          <a:blip r:embed="rId2"/>
+          <a:srcRect l="8188" r="47960" b="-1"/>
+          <a:stretch/>
+        </p:blipFill>
+        <p:spPr>
+          <a:xfrm>
+            <a:off x="20" y="10"/>
+            <a:ext cx="4505305" cy="6857990"/>
+          </a:xfrm>
+          <a:prstGeom prst="rect">
+            <a:avLst/>
+          </a:prstGeom>
+        </p:spPr>
+      </p:pic>
+      <p:sp>
+        <p:nvSpPr>
+          <p:cNvPr id="11" name="Rectangle 10">
+            <a:extLst>
+              <a:ext uri="{FF2B5EF4-FFF2-40B4-BE49-F238E27FC236}">
+                <a16:creationId xmlns:a16="http://schemas.microsoft.com/office/drawing/2014/main" id="{EABAD4DA-87BA-4F70-9EF0-45C6BCF17823}"/>
+              </a:ext>
+              <a:ext uri="{C183D7F6-B498-43B3-948B-1728B52AA6E4}">
+                <adec:decorative xmlns:adec="http://schemas.microsoft.com/office/drawing/2017/decorative" val="1"/>
+              </a:ext>
+            </a:extLst>
+          </p:cNvPr>
+          <p:cNvSpPr>
+            <a:spLocks noGrp="1" noRot="1" noChangeAspect="1" noMove="1" noResize="1" noEditPoints="1" noAdjustHandles="1" noChangeArrowheads="1" noChangeShapeType="1" noTextEdit="1"/>
+          </p:cNvSpPr>
+          <p:nvPr>
+            <p:extLst>
+              <p:ext uri="{386F3935-93C4-4BCD-93E2-E3B085C9AB24}">
+                <p16:designElem xmlns:p16="http://schemas.microsoft.com/office/powerpoint/2015/main" val="1"/>
+              </p:ext>
+            </p:extLst>
+          </p:nvPr>
+        </p:nvSpPr>
+        <p:spPr>
+          <a:xfrm rot="5400000">
+            <a:off x="5317960" y="363389"/>
+            <a:ext cx="73152" cy="548640"/>
+          </a:xfrm>
+          <a:prstGeom prst="rect">
+            <a:avLst/>
+          </a:prstGeom>
+          <a:solidFill>
+            <a:schemeClr val="accent2"/>
+          </a:solidFill>
+          <a:ln>
+            <a:noFill/>
+          </a:ln>
+        </p:spPr>
+        <p:style>
+          <a:lnRef idx="2">
+            <a:schemeClr val="accent1">
+              <a:shade val="50000"/>
+            </a:schemeClr>
+          </a:lnRef>
+          <a:fillRef idx="1">
+            <a:schemeClr val="accent1"/>
+          </a:fillRef>
+          <a:effectRef idx="0">
+            <a:schemeClr val="accent1"/>
+          </a:effectRef>
+          <a:fontRef idx="minor">
+            <a:schemeClr val="lt1"/>
+          </a:fontRef>
+        </p:style>
+        <p:txBody>
+          <a:bodyPr rtlCol="0" anchor="ctr"/>
+          <a:lstStyle/>
+          <a:p>
+            <a:pPr marL="0" marR="0" lvl="0" indent="0" algn="ctr" defTabSz="914400" rtl="0" eaLnBrk="1" fontAlgn="auto" latinLnBrk="0" hangingPunct="1">
+              <a:lnSpc>
+                <a:spcPct val="100000"/>
+              </a:lnSpc>
+              <a:spcBef>
+                <a:spcPts val="0"/>
+              </a:spcBef>
+              <a:spcAft>
+                <a:spcPts val="0"/>
+              </a:spcAft>
+              <a:buClrTx/>
+              <a:buSzTx/>
+              <a:buFontTx/>
+              <a:buNone/>
+              <a:tabLst/>
+              <a:defRPr/>
+            </a:pPr>
+            <a:endParaRPr kumimoji="0" lang="en-US" sz="1800" b="0" i="0" u="none" strike="noStrike" kern="1200" cap="none" spc="0" normalizeH="0" baseline="0" noProof="0">
+              <a:ln>
+                <a:noFill/>
+              </a:ln>
+              <a:solidFill>
+                <a:prstClr val="white"/>
+              </a:solidFill>
+              <a:effectLst/>
+              <a:uLnTx/>
+              <a:uFillTx/>
+              <a:latin typeface="Calibri" panose="020F0502020204030204"/>
+              <a:ea typeface="+mn-ea"/>
+              <a:cs typeface="+mn-cs"/>
+            </a:endParaRPr>
+          </a:p>
+        </p:txBody>
+      </p:sp>
+      <p:sp>
+        <p:nvSpPr>
+          <p:cNvPr id="13" name="Rectangle 12">
+            <a:extLst>
+              <a:ext uri="{FF2B5EF4-FFF2-40B4-BE49-F238E27FC236}">
+                <a16:creationId xmlns:a16="http://schemas.microsoft.com/office/drawing/2014/main" id="{915128D9-2797-47FA-B6FE-EC24E6B8437A}"/>
+              </a:ext>
+              <a:ext uri="{C183D7F6-B498-43B3-948B-1728B52AA6E4}">
+                <adec:decorative xmlns:adec="http://schemas.microsoft.com/office/drawing/2017/decorative" val="1"/>
+              </a:ext>
+            </a:extLst>
+          </p:cNvPr>
+          <p:cNvSpPr>
+            <a:spLocks noGrp="1" noRot="1" noChangeAspect="1" noMove="1" noResize="1" noEditPoints="1" noAdjustHandles="1" noChangeArrowheads="1" noChangeShapeType="1" noTextEdit="1"/>
+          </p:cNvSpPr>
+          <p:nvPr>
+            <p:extLst>
+              <p:ext uri="{386F3935-93C4-4BCD-93E2-E3B085C9AB24}">
+                <p16:designElem xmlns:p16="http://schemas.microsoft.com/office/powerpoint/2015/main" val="1"/>
+              </p:ext>
+            </p:extLst>
+          </p:nvPr>
+        </p:nvSpPr>
+        <p:spPr>
+          <a:xfrm>
+            <a:off x="5099266" y="2935541"/>
+            <a:ext cx="6217920" cy="18288"/>
+          </a:xfrm>
+          <a:prstGeom prst="rect">
+            <a:avLst/>
+          </a:prstGeom>
+          <a:solidFill>
+            <a:srgbClr val="D5D5D5"/>
+          </a:solidFill>
+          <a:ln w="3175">
+            <a:noFill/>
+          </a:ln>
+          <a:effectLst/>
+        </p:spPr>
+        <p:style>
+          <a:lnRef idx="2">
+            <a:schemeClr val="accent1">
+              <a:shade val="50000"/>
+            </a:schemeClr>
+          </a:lnRef>
+          <a:fillRef idx="1">
+            <a:schemeClr val="accent1"/>
+          </a:fillRef>
+          <a:effectRef idx="0">
+            <a:schemeClr val="accent1"/>
+          </a:effectRef>
+          <a:fontRef idx="minor">
+            <a:schemeClr val="lt1"/>
+          </a:fontRef>
+        </p:style>
+        <p:txBody>
+          <a:bodyPr rtlCol="0" anchor="ctr"/>
+          <a:lstStyle/>
+          <a:p>
+            <a:pPr algn="ctr"/>
+            <a:endParaRPr lang="en-US">
+              <a:solidFill>
+                <a:prstClr val="white"/>
+              </a:solidFill>
+              <a:latin typeface="Calibri" panose="020F0502020204030204"/>
+            </a:endParaRPr>
+          </a:p>
+        </p:txBody>
+      </p:sp>
+      <p:sp>
+        <p:nvSpPr>
+          <p:cNvPr id="3" name="Espace réservé du contenu 2">
+            <a:extLst>
+              <a:ext uri="{FF2B5EF4-FFF2-40B4-BE49-F238E27FC236}">
+                <a16:creationId xmlns:a16="http://schemas.microsoft.com/office/drawing/2014/main" id="{7DF2BE44-19FA-4F51-9962-B921993F5895}"/>
+              </a:ext>
+            </a:extLst>
+          </p:cNvPr>
+          <p:cNvSpPr>
+            <a:spLocks noGrp="1"/>
+          </p:cNvSpPr>
+          <p:nvPr>
+            <p:ph idx="1"/>
+          </p:nvPr>
+        </p:nvSpPr>
+        <p:spPr>
+          <a:xfrm>
+            <a:off x="5080216" y="3351276"/>
+            <a:ext cx="6272784" cy="2825686"/>
+          </a:xfrm>
+        </p:spPr>
+        <p:txBody>
+          <a:bodyPr>
+            <a:normAutofit/>
+          </a:bodyPr>
+          <a:lstStyle/>
+          <a:p>
+            <a:r>
+              <a:rPr lang="fr-FR" sz="1700" dirty="0"/>
+              <a:t>Beaucoup d’auto-formation :</a:t>
+            </a:r>
+          </a:p>
+          <a:p>
+            <a:pPr lvl="1"/>
+            <a:r>
+              <a:rPr lang="fr-FR" sz="1700" dirty="0" err="1"/>
+              <a:t>OpenClassRoom</a:t>
+            </a:r>
+            <a:endParaRPr lang="fr-FR" sz="1700" dirty="0"/>
+          </a:p>
+          <a:p>
+            <a:pPr lvl="1"/>
+            <a:r>
+              <a:rPr lang="fr-FR" sz="1700" dirty="0"/>
+              <a:t>MDN (Mozilla </a:t>
+            </a:r>
+            <a:r>
+              <a:rPr lang="fr-FR" sz="1700" dirty="0" err="1"/>
+              <a:t>Developer</a:t>
+            </a:r>
+            <a:r>
+              <a:rPr lang="fr-FR" sz="1700" dirty="0"/>
+              <a:t> Network)</a:t>
+            </a:r>
+          </a:p>
+          <a:p>
+            <a:pPr lvl="1"/>
+            <a:r>
+              <a:rPr lang="fr-FR" sz="1700" dirty="0"/>
+              <a:t>W3School</a:t>
+            </a:r>
+          </a:p>
+          <a:p>
+            <a:pPr lvl="1"/>
+            <a:r>
+              <a:rPr lang="fr-FR" sz="1700" dirty="0"/>
+              <a:t>Aide part des camarade </a:t>
+            </a:r>
+          </a:p>
+          <a:p>
+            <a:r>
+              <a:rPr lang="fr-FR" sz="1700" dirty="0"/>
+              <a:t>Logiciel :</a:t>
+            </a:r>
+          </a:p>
+          <a:p>
+            <a:pPr lvl="1"/>
+            <a:r>
+              <a:rPr lang="fr-FR" sz="1700" dirty="0"/>
+              <a:t>JavaScript</a:t>
+            </a:r>
+          </a:p>
+          <a:p>
+            <a:pPr lvl="1"/>
+            <a:r>
+              <a:rPr lang="fr-FR" sz="1700" dirty="0"/>
+              <a:t>CSS</a:t>
+            </a:r>
+          </a:p>
+          <a:p>
+            <a:pPr lvl="1"/>
+            <a:r>
+              <a:rPr lang="fr-FR" sz="1700" dirty="0"/>
+              <a:t>HTML</a:t>
+            </a:r>
+          </a:p>
+          <a:p>
+            <a:pPr marL="457200" lvl="1" indent="0">
+              <a:buNone/>
+            </a:pPr>
+            <a:endParaRPr lang="fr-FR" sz="1700" dirty="0"/>
+          </a:p>
+          <a:p>
+            <a:pPr marL="457200" lvl="1" indent="0">
+              <a:buNone/>
+            </a:pPr>
+            <a:endParaRPr lang="fr-FR" sz="1700" dirty="0"/>
+          </a:p>
+        </p:txBody>
+      </p:sp>
+    </p:spTree>
+    <p:extLst>
+      <p:ext uri="{BB962C8B-B14F-4D97-AF65-F5344CB8AC3E}">
+        <p14:creationId xmlns:p14="http://schemas.microsoft.com/office/powerpoint/2010/main" val="311270466"/>
+      </p:ext>
+    </p:extLst>
+  </p:cSld>
+  <p:clrMapOvr>
+    <a:masterClrMapping/>
+  </p:clrMapOvr>
+</p:sld>
+</file>
+
+<file path=ppt/slides/slide11.xml><?xml version="1.0" encoding="utf-8"?>
+<p:sld xmlns:a="http://schemas.openxmlformats.org/drawingml/2006/main" xmlns:r="http://schemas.openxmlformats.org/officeDocument/2006/relationships" xmlns:p="http://schemas.openxmlformats.org/presentationml/2006/main">
+  <p:cSld>
+    <p:bg>
+      <p:bgPr>
+        <a:solidFill>
+          <a:schemeClr val="bg1">
+            <a:tint val="95000"/>
+            <a:satMod val="170000"/>
+          </a:schemeClr>
+        </a:solidFill>
+        <a:effectLst/>
+      </p:bgPr>
+    </p:bg>
+    <p:spTree>
+      <p:nvGrpSpPr>
+        <p:cNvPr id="1" name=""/>
+        <p:cNvGrpSpPr/>
+        <p:nvPr/>
+      </p:nvGrpSpPr>
+      <p:grpSpPr>
+        <a:xfrm>
+          <a:off x="0" y="0"/>
+          <a:ext cx="0" cy="0"/>
+          <a:chOff x="0" y="0"/>
+          <a:chExt cx="0" cy="0"/>
+        </a:xfrm>
+      </p:grpSpPr>
+      <p:sp>
+        <p:nvSpPr>
+          <p:cNvPr id="2" name="Titre 1">
+            <a:extLst>
+              <a:ext uri="{FF2B5EF4-FFF2-40B4-BE49-F238E27FC236}">
+                <a16:creationId xmlns:a16="http://schemas.microsoft.com/office/drawing/2014/main" id="{EF2FAC93-169D-48B4-BD8E-6C9E8AE13CB9}"/>
+              </a:ext>
+            </a:extLst>
+          </p:cNvPr>
+          <p:cNvSpPr>
+            <a:spLocks noGrp="1"/>
+          </p:cNvSpPr>
+          <p:nvPr>
+            <p:ph type="title"/>
+          </p:nvPr>
+        </p:nvSpPr>
+        <p:spPr>
+          <a:xfrm>
+            <a:off x="6812615" y="176689"/>
+            <a:ext cx="4645250" cy="2889114"/>
+          </a:xfrm>
+        </p:spPr>
+        <p:txBody>
+          <a:bodyPr vert="horz" lIns="91440" tIns="45720" rIns="91440" bIns="45720" rtlCol="0" anchor="b">
+            <a:normAutofit/>
+          </a:bodyPr>
+          <a:lstStyle/>
+          <a:p>
+            <a:pPr algn="ctr"/>
+            <a:r>
+              <a:rPr lang="en-US" sz="6000" dirty="0"/>
+              <a:t>FAQ</a:t>
+            </a:r>
+          </a:p>
+        </p:txBody>
+      </p:sp>
+      <p:sp>
+        <p:nvSpPr>
+          <p:cNvPr id="3" name="Espace réservé du contenu 2">
+            <a:extLst>
+              <a:ext uri="{FF2B5EF4-FFF2-40B4-BE49-F238E27FC236}">
+                <a16:creationId xmlns:a16="http://schemas.microsoft.com/office/drawing/2014/main" id="{21E8835C-4BEC-40AD-9628-2C007E024F67}"/>
+              </a:ext>
+            </a:extLst>
+          </p:cNvPr>
+          <p:cNvSpPr>
+            <a:spLocks noGrp="1"/>
+          </p:cNvSpPr>
+          <p:nvPr>
+            <p:ph idx="1"/>
+          </p:nvPr>
+        </p:nvSpPr>
+        <p:spPr>
+          <a:xfrm>
+            <a:off x="6733438" y="3867266"/>
+            <a:ext cx="4645250" cy="1147863"/>
+          </a:xfrm>
+        </p:spPr>
+        <p:txBody>
+          <a:bodyPr vert="horz" lIns="91440" tIns="45720" rIns="91440" bIns="45720" rtlCol="0" anchor="t">
+            <a:normAutofit/>
+          </a:bodyPr>
+          <a:lstStyle/>
+          <a:p>
+            <a:pPr marL="0" indent="0">
+              <a:buNone/>
+            </a:pPr>
+            <a:r>
+              <a:rPr lang="en-US" dirty="0" err="1"/>
+              <a:t>Avez-vous</a:t>
+            </a:r>
+            <a:r>
+              <a:rPr lang="en-US" dirty="0"/>
+              <a:t> des questions ?</a:t>
+            </a:r>
+          </a:p>
+        </p:txBody>
+      </p:sp>
+      <p:sp>
+        <p:nvSpPr>
+          <p:cNvPr id="18" name="Freeform: Shape 17">
+            <a:extLst>
+              <a:ext uri="{FF2B5EF4-FFF2-40B4-BE49-F238E27FC236}">
+                <a16:creationId xmlns:a16="http://schemas.microsoft.com/office/drawing/2014/main" id="{1DB7C82F-AB7E-4F0C-B829-FA1B9C415180}"/>
+              </a:ext>
+              <a:ext uri="{C183D7F6-B498-43B3-948B-1728B52AA6E4}">
+                <adec:decorative xmlns:adec="http://schemas.microsoft.com/office/drawing/2017/decorative" val="1"/>
+              </a:ext>
+            </a:extLst>
+          </p:cNvPr>
+          <p:cNvSpPr>
+            <a:spLocks noGrp="1" noRot="1" noChangeAspect="1" noMove="1" noResize="1" noEditPoints="1" noAdjustHandles="1" noChangeArrowheads="1" noChangeShapeType="1" noTextEdit="1"/>
+          </p:cNvSpPr>
+          <p:nvPr>
+            <p:extLst>
+              <p:ext uri="{386F3935-93C4-4BCD-93E2-E3B085C9AB24}">
+                <p16:designElem xmlns:p16="http://schemas.microsoft.com/office/powerpoint/2015/main" val="1"/>
+              </p:ext>
+            </p:extLst>
+          </p:nvPr>
+        </p:nvSpPr>
+        <p:spPr>
+          <a:xfrm flipH="1">
+            <a:off x="0" y="0"/>
+            <a:ext cx="6172782" cy="6858000"/>
+          </a:xfrm>
+          <a:custGeom>
+            <a:avLst/>
+            <a:gdLst>
+              <a:gd name="connsiteX0" fmla="*/ 6172782 w 6172782"/>
+              <a:gd name="connsiteY0" fmla="*/ 0 h 6858000"/>
+              <a:gd name="connsiteX1" fmla="*/ 69075 w 6172782"/>
+              <a:gd name="connsiteY1" fmla="*/ 0 h 6858000"/>
+              <a:gd name="connsiteX2" fmla="*/ 35131 w 6172782"/>
+              <a:gd name="connsiteY2" fmla="*/ 267128 h 6858000"/>
+              <a:gd name="connsiteX3" fmla="*/ 0 w 6172782"/>
+              <a:gd name="connsiteY3" fmla="*/ 962845 h 6858000"/>
+              <a:gd name="connsiteX4" fmla="*/ 3276103 w 6172782"/>
+              <a:gd name="connsiteY4" fmla="*/ 6782205 h 6858000"/>
+              <a:gd name="connsiteX5" fmla="*/ 3407923 w 6172782"/>
+              <a:gd name="connsiteY5" fmla="*/ 6858000 h 6858000"/>
+              <a:gd name="connsiteX6" fmla="*/ 6172782 w 6172782"/>
+              <a:gd name="connsiteY6" fmla="*/ 6858000 h 6858000"/>
+            </a:gdLst>
+            <a:ahLst/>
+            <a:cxnLst>
+              <a:cxn ang="0">
+                <a:pos x="connsiteX0" y="connsiteY0"/>
+              </a:cxn>
+              <a:cxn ang="0">
+                <a:pos x="connsiteX1" y="connsiteY1"/>
+              </a:cxn>
+              <a:cxn ang="0">
+                <a:pos x="connsiteX2" y="connsiteY2"/>
+              </a:cxn>
+              <a:cxn ang="0">
+                <a:pos x="connsiteX3" y="connsiteY3"/>
+              </a:cxn>
+              <a:cxn ang="0">
+                <a:pos x="connsiteX4" y="connsiteY4"/>
+              </a:cxn>
+              <a:cxn ang="0">
+                <a:pos x="connsiteX5" y="connsiteY5"/>
+              </a:cxn>
+              <a:cxn ang="0">
+                <a:pos x="connsiteX6" y="connsiteY6"/>
+              </a:cxn>
+            </a:cxnLst>
+            <a:rect l="l" t="t" r="r" b="b"/>
+            <a:pathLst>
+              <a:path w="6172782" h="6858000">
+                <a:moveTo>
+                  <a:pt x="6172782" y="0"/>
+                </a:moveTo>
+                <a:lnTo>
+                  <a:pt x="69075" y="0"/>
+                </a:lnTo>
+                <a:lnTo>
+                  <a:pt x="35131" y="267128"/>
+                </a:lnTo>
+                <a:cubicBezTo>
+                  <a:pt x="11901" y="495874"/>
+                  <a:pt x="0" y="727970"/>
+                  <a:pt x="0" y="962845"/>
+                </a:cubicBezTo>
+                <a:cubicBezTo>
+                  <a:pt x="0" y="3429034"/>
+                  <a:pt x="1312002" y="5588789"/>
+                  <a:pt x="3276103" y="6782205"/>
+                </a:cubicBezTo>
+                <a:lnTo>
+                  <a:pt x="3407923" y="6858000"/>
+                </a:lnTo>
+                <a:lnTo>
+                  <a:pt x="6172782" y="6858000"/>
+                </a:lnTo>
+                <a:close/>
+              </a:path>
+            </a:pathLst>
+          </a:custGeom>
+          <a:solidFill>
+            <a:srgbClr val="FFFFFF">
+              <a:alpha val="80000"/>
+            </a:srgbClr>
+          </a:solidFill>
+          <a:ln>
+            <a:noFill/>
+          </a:ln>
+        </p:spPr>
+        <p:style>
+          <a:lnRef idx="2">
+            <a:schemeClr val="accent1">
+              <a:shade val="50000"/>
+            </a:schemeClr>
+          </a:lnRef>
+          <a:fillRef idx="1">
+            <a:schemeClr val="accent1"/>
+          </a:fillRef>
+          <a:effectRef idx="0">
+            <a:schemeClr val="accent1"/>
+          </a:effectRef>
+          <a:fontRef idx="minor">
+            <a:schemeClr val="lt1"/>
+          </a:fontRef>
+        </p:style>
+        <p:txBody>
+          <a:bodyPr wrap="square" rtlCol="0" anchor="ctr">
+            <a:noAutofit/>
+          </a:bodyPr>
+          <a:lstStyle/>
+          <a:p>
+            <a:pPr marL="0" marR="0" lvl="0" indent="0" algn="ctr" defTabSz="914400" rtl="0" eaLnBrk="1" fontAlgn="auto" latinLnBrk="0" hangingPunct="1">
+              <a:lnSpc>
+                <a:spcPct val="100000"/>
+              </a:lnSpc>
+              <a:spcBef>
+                <a:spcPts val="0"/>
+              </a:spcBef>
+              <a:spcAft>
+                <a:spcPts val="0"/>
+              </a:spcAft>
+              <a:buClrTx/>
+              <a:buSzTx/>
+              <a:buFontTx/>
+              <a:buNone/>
+              <a:tabLst/>
+              <a:defRPr/>
+            </a:pPr>
+            <a:endParaRPr kumimoji="0" lang="en-US" sz="1800" b="0" i="0" u="none" strike="noStrike" kern="1200" cap="none" spc="0" normalizeH="0" baseline="0" noProof="0">
+              <a:ln>
+                <a:noFill/>
+              </a:ln>
+              <a:solidFill>
+                <a:prstClr val="white"/>
+              </a:solidFill>
+              <a:effectLst/>
+              <a:uLnTx/>
+              <a:uFillTx/>
+              <a:latin typeface="Calibri" panose="020F0502020204030204"/>
+              <a:ea typeface="+mn-ea"/>
+              <a:cs typeface="+mn-cs"/>
+            </a:endParaRPr>
+          </a:p>
+        </p:txBody>
+      </p:sp>
+      <p:pic>
+        <p:nvPicPr>
+          <p:cNvPr id="5" name="Picture 4" descr="Une image contenant alimentation, blanc, lit, pièce&#10;&#10;Description générée automatiquement">
+            <a:extLst>
+              <a:ext uri="{FF2B5EF4-FFF2-40B4-BE49-F238E27FC236}">
+                <a16:creationId xmlns:a16="http://schemas.microsoft.com/office/drawing/2014/main" id="{07FC3549-0A68-45F5-B3E5-45DA3BFB9C22}"/>
+              </a:ext>
+            </a:extLst>
+          </p:cNvPr>
+          <p:cNvPicPr>
+            <a:picLocks noChangeAspect="1"/>
+          </p:cNvPicPr>
+          <p:nvPr/>
+        </p:nvPicPr>
+        <p:blipFill rotWithShape="1">
+          <a:blip r:embed="rId2"/>
+          <a:srcRect l="46416" r="2" b="2"/>
+          <a:stretch/>
+        </p:blipFill>
+        <p:spPr>
+          <a:xfrm>
+            <a:off x="20" y="10"/>
+            <a:ext cx="6024134" cy="6857990"/>
+          </a:xfrm>
+          <a:custGeom>
+            <a:avLst/>
+            <a:gdLst/>
+            <a:ahLst/>
+            <a:cxnLst/>
+            <a:rect l="l" t="t" r="r" b="b"/>
+            <a:pathLst>
+              <a:path w="6024154" h="6858000">
+                <a:moveTo>
+                  <a:pt x="0" y="0"/>
+                </a:moveTo>
+                <a:lnTo>
+                  <a:pt x="5953780" y="0"/>
+                </a:lnTo>
+                <a:lnTo>
+                  <a:pt x="5989880" y="284091"/>
+                </a:lnTo>
+                <a:cubicBezTo>
+                  <a:pt x="6012544" y="507260"/>
+                  <a:pt x="6024154" y="733696"/>
+                  <a:pt x="6024154" y="962844"/>
+                </a:cubicBezTo>
+                <a:cubicBezTo>
+                  <a:pt x="6024154" y="3483472"/>
+                  <a:pt x="4619336" y="5675986"/>
+                  <a:pt x="2549934" y="6800152"/>
+                </a:cubicBezTo>
+                <a:lnTo>
+                  <a:pt x="2436987" y="6858000"/>
+                </a:lnTo>
+                <a:lnTo>
+                  <a:pt x="0" y="6858000"/>
+                </a:lnTo>
+                <a:close/>
+              </a:path>
+            </a:pathLst>
+          </a:custGeom>
+        </p:spPr>
+      </p:pic>
+    </p:spTree>
+    <p:extLst>
+      <p:ext uri="{BB962C8B-B14F-4D97-AF65-F5344CB8AC3E}">
+        <p14:creationId xmlns:p14="http://schemas.microsoft.com/office/powerpoint/2010/main" val="2115081749"/>
+      </p:ext>
+    </p:extLst>
+  </p:cSld>
+  <p:clrMapOvr>
+    <a:overrideClrMapping bg1="dk1" tx1="lt1" bg2="dk2" tx2="lt2" accent1="accent1" accent2="accent2" accent3="accent3" accent4="accent4" accent5="accent5" accent6="accent6" hlink="hlink" folHlink="folHlink"/>
+  </p:clrMapOvr>
+</p:sld>
+</file>
+
 <file path=ppt/slides/slide2.xml><?xml version="1.0" encoding="utf-8"?>
 <p:sld xmlns:a="http://schemas.openxmlformats.org/drawingml/2006/main" xmlns:r="http://schemas.openxmlformats.org/officeDocument/2006/relationships" xmlns:p="http://schemas.openxmlformats.org/presentationml/2006/main">
   <p:cSld>
@@ -8442,7 +9759,7 @@
                   <a:srgbClr val="FFFFFF"/>
                 </a:solidFill>
               </a:rPr>
-              <a:t>LOUANE NERRIERE </a:t>
+              <a:t>LOUAN NERRIERE </a:t>
             </a:r>
           </a:p>
           <a:p>
@@ -9116,10 +10433,7 @@
     <p:bg>
       <p:bgPr>
         <a:solidFill>
-          <a:schemeClr val="bg1">
-            <a:tint val="95000"/>
-            <a:satMod val="170000"/>
-          </a:schemeClr>
+          <a:schemeClr val="bg1"/>
         </a:solidFill>
         <a:effectLst/>
       </p:bgPr>
@@ -9140,10 +10454,10 @@
       </p:grpSpPr>
       <p:sp>
         <p:nvSpPr>
-          <p:cNvPr id="10" name="Rectangle 9">
+          <p:cNvPr id="19" name="Rectangle 18">
             <a:extLst>
               <a:ext uri="{FF2B5EF4-FFF2-40B4-BE49-F238E27FC236}">
-                <a16:creationId xmlns:a16="http://schemas.microsoft.com/office/drawing/2014/main" id="{5B32A67F-3598-4A13-8552-DA884FFCCE57}"/>
+                <a16:creationId xmlns:a16="http://schemas.microsoft.com/office/drawing/2014/main" id="{823AC064-BC96-4F32-8AE1-B2FD38754823}"/>
               </a:ext>
               <a:ext uri="{C183D7F6-B498-43B3-948B-1728B52AA6E4}">
                 <adec:decorative xmlns:adec="http://schemas.microsoft.com/office/drawing/2017/decorative" val="1"/>
@@ -9161,22 +10475,21 @@
             </p:extLst>
           </p:nvPr>
         </p:nvSpPr>
-        <p:spPr>
+        <p:spPr bwMode="ltGray">
           <a:xfrm>
-            <a:off x="0" y="0"/>
-            <a:ext cx="12192000" cy="6858000"/>
+            <a:off x="396882" y="280374"/>
+            <a:ext cx="11438793" cy="1844256"/>
           </a:xfrm>
           <a:prstGeom prst="rect">
             <a:avLst/>
           </a:prstGeom>
           <a:solidFill>
-            <a:schemeClr val="tx1">
-              <a:lumMod val="75000"/>
-              <a:lumOff val="25000"/>
-            </a:schemeClr>
+            <a:srgbClr val="404040"/>
           </a:solidFill>
-          <a:ln>
-            <a:noFill/>
+          <a:ln w="127000" cap="sq" cmpd="thinThick">
+            <a:solidFill>
+              <a:srgbClr val="404040"/>
+            </a:solidFill>
           </a:ln>
         </p:spPr>
         <p:style>
@@ -9222,45 +10535,43 @@
         </p:nvSpPr>
         <p:spPr>
           <a:xfrm>
-            <a:off x="1280663" y="856903"/>
-            <a:ext cx="3295987" cy="789228"/>
+            <a:off x="546351" y="433545"/>
+            <a:ext cx="11139854" cy="930447"/>
           </a:xfrm>
         </p:spPr>
         <p:txBody>
-          <a:bodyPr vert="horz" lIns="91440" tIns="45720" rIns="91440" bIns="45720" rtlCol="0" anchor="t">
+          <a:bodyPr vert="horz" lIns="91440" tIns="45720" rIns="91440" bIns="45720" rtlCol="0" anchor="b">
             <a:normAutofit/>
           </a:bodyPr>
           <a:lstStyle/>
           <a:p>
+            <a:pPr algn="ctr"/>
             <a:r>
-              <a:rPr lang="en-US" sz="4800" kern="1200" dirty="0">
+              <a:rPr lang="en-US" sz="5400">
                 <a:solidFill>
-                  <a:schemeClr val="bg1"/>
+                  <a:srgbClr val="FFFFFF"/>
                 </a:solidFill>
-                <a:latin typeface="+mj-lt"/>
-                <a:ea typeface="+mj-ea"/>
-                <a:cs typeface="+mj-cs"/>
               </a:rPr>
               <a:t>Introduction</a:t>
             </a:r>
           </a:p>
         </p:txBody>
       </p:sp>
-      <p:sp>
-        <p:nvSpPr>
-          <p:cNvPr id="12" name="Freeform: Shape 11">
+      <p:cxnSp>
+        <p:nvCxnSpPr>
+          <p:cNvPr id="21" name="Straight Connector 20">
             <a:extLst>
               <a:ext uri="{FF2B5EF4-FFF2-40B4-BE49-F238E27FC236}">
-                <a16:creationId xmlns:a16="http://schemas.microsoft.com/office/drawing/2014/main" id="{BCC55ACC-A2F6-403C-A3A4-D59B3734D45F}"/>
+                <a16:creationId xmlns:a16="http://schemas.microsoft.com/office/drawing/2014/main" id="{7E7C77BC-7138-40B1-A15B-20F57A494629}"/>
               </a:ext>
               <a:ext uri="{C183D7F6-B498-43B3-948B-1728B52AA6E4}">
                 <adec:decorative xmlns:adec="http://schemas.microsoft.com/office/drawing/2017/decorative" val="1"/>
               </a:ext>
             </a:extLst>
           </p:cNvPr>
-          <p:cNvSpPr>
-            <a:spLocks noGrp="1" noRot="1" noChangeAspect="1" noMove="1" noResize="1" noEditPoints="1" noAdjustHandles="1" noChangeArrowheads="1" noChangeShapeType="1" noTextEdit="1"/>
-          </p:cNvSpPr>
+          <p:cNvCxnSpPr>
+            <a:cxnSpLocks noGrp="1" noRot="1" noChangeAspect="1" noMove="1" noResize="1" noEditPoints="1" noAdjustHandles="1" noChangeArrowheads="1" noChangeShapeType="1"/>
+          </p:cNvCxnSpPr>
           <p:nvPr>
             <p:extLst>
               <p:ext uri="{386F3935-93C4-4BCD-93E2-E3B085C9AB24}">
@@ -9268,384 +10579,36 @@
               </p:ext>
             </p:extLst>
           </p:nvPr>
-        </p:nvSpPr>
+        </p:nvCxnSpPr>
         <p:spPr>
           <a:xfrm>
-            <a:off x="5857312" y="381000"/>
-            <a:ext cx="6334689" cy="6477000"/>
+            <a:off x="2230078" y="1522292"/>
+            <a:ext cx="7772400" cy="0"/>
           </a:xfrm>
-          <a:custGeom>
+          <a:prstGeom prst="line">
             <a:avLst/>
-            <a:gdLst>
-              <a:gd name="connsiteX0" fmla="*/ 3561588 w 6334689"/>
-              <a:gd name="connsiteY0" fmla="*/ 0 h 6477000"/>
-              <a:gd name="connsiteX1" fmla="*/ 6309883 w 6334689"/>
-              <a:gd name="connsiteY1" fmla="*/ 1296087 h 6477000"/>
-              <a:gd name="connsiteX2" fmla="*/ 6334689 w 6334689"/>
-              <a:gd name="connsiteY2" fmla="*/ 1329261 h 6477000"/>
-              <a:gd name="connsiteX3" fmla="*/ 6334689 w 6334689"/>
-              <a:gd name="connsiteY3" fmla="*/ 5793916 h 6477000"/>
-              <a:gd name="connsiteX4" fmla="*/ 6309883 w 6334689"/>
-              <a:gd name="connsiteY4" fmla="*/ 5827089 h 6477000"/>
-              <a:gd name="connsiteX5" fmla="*/ 5760467 w 6334689"/>
-              <a:gd name="connsiteY5" fmla="*/ 6363539 h 6477000"/>
-              <a:gd name="connsiteX6" fmla="*/ 5607796 w 6334689"/>
-              <a:gd name="connsiteY6" fmla="*/ 6477000 h 6477000"/>
-              <a:gd name="connsiteX7" fmla="*/ 1519571 w 6334689"/>
-              <a:gd name="connsiteY7" fmla="*/ 6477000 h 6477000"/>
-              <a:gd name="connsiteX8" fmla="*/ 1296088 w 6334689"/>
-              <a:gd name="connsiteY8" fmla="*/ 6309883 h 6477000"/>
-              <a:gd name="connsiteX9" fmla="*/ 0 w 6334689"/>
-              <a:gd name="connsiteY9" fmla="*/ 3561588 h 6477000"/>
-              <a:gd name="connsiteX10" fmla="*/ 3561588 w 6334689"/>
-              <a:gd name="connsiteY10" fmla="*/ 0 h 6477000"/>
-            </a:gdLst>
-            <a:ahLst/>
-            <a:cxnLst>
-              <a:cxn ang="0">
-                <a:pos x="connsiteX0" y="connsiteY0"/>
-              </a:cxn>
-              <a:cxn ang="0">
-                <a:pos x="connsiteX1" y="connsiteY1"/>
-              </a:cxn>
-              <a:cxn ang="0">
-                <a:pos x="connsiteX2" y="connsiteY2"/>
-              </a:cxn>
-              <a:cxn ang="0">
-                <a:pos x="connsiteX3" y="connsiteY3"/>
-              </a:cxn>
-              <a:cxn ang="0">
-                <a:pos x="connsiteX4" y="connsiteY4"/>
-              </a:cxn>
-              <a:cxn ang="0">
-                <a:pos x="connsiteX5" y="connsiteY5"/>
-              </a:cxn>
-              <a:cxn ang="0">
-                <a:pos x="connsiteX6" y="connsiteY6"/>
-              </a:cxn>
-              <a:cxn ang="0">
-                <a:pos x="connsiteX7" y="connsiteY7"/>
-              </a:cxn>
-              <a:cxn ang="0">
-                <a:pos x="connsiteX8" y="connsiteY8"/>
-              </a:cxn>
-              <a:cxn ang="0">
-                <a:pos x="connsiteX9" y="connsiteY9"/>
-              </a:cxn>
-              <a:cxn ang="0">
-                <a:pos x="connsiteX10" y="connsiteY10"/>
-              </a:cxn>
-            </a:cxnLst>
-            <a:rect l="l" t="t" r="r" b="b"/>
-            <a:pathLst>
-              <a:path w="6334689" h="6477000">
-                <a:moveTo>
-                  <a:pt x="3561588" y="0"/>
-                </a:moveTo>
-                <a:cubicBezTo>
-                  <a:pt x="4668032" y="0"/>
-                  <a:pt x="5656635" y="504534"/>
-                  <a:pt x="6309883" y="1296087"/>
-                </a:cubicBezTo>
-                <a:lnTo>
-                  <a:pt x="6334689" y="1329261"/>
-                </a:lnTo>
-                <a:lnTo>
-                  <a:pt x="6334689" y="5793916"/>
-                </a:lnTo>
-                <a:lnTo>
-                  <a:pt x="6309883" y="5827089"/>
-                </a:lnTo>
-                <a:cubicBezTo>
-                  <a:pt x="6146571" y="6024977"/>
-                  <a:pt x="5962299" y="6204927"/>
-                  <a:pt x="5760467" y="6363539"/>
-                </a:cubicBezTo>
-                <a:lnTo>
-                  <a:pt x="5607796" y="6477000"/>
-                </a:lnTo>
-                <a:lnTo>
-                  <a:pt x="1519571" y="6477000"/>
-                </a:lnTo>
-                <a:lnTo>
-                  <a:pt x="1296088" y="6309883"/>
-                </a:lnTo>
-                <a:cubicBezTo>
-                  <a:pt x="504535" y="5656635"/>
-                  <a:pt x="0" y="4668032"/>
-                  <a:pt x="0" y="3561588"/>
-                </a:cubicBezTo>
-                <a:cubicBezTo>
-                  <a:pt x="0" y="1594577"/>
-                  <a:pt x="1594577" y="0"/>
-                  <a:pt x="3561588" y="0"/>
-                </a:cubicBezTo>
-                <a:close/>
-              </a:path>
-            </a:pathLst>
-          </a:custGeom>
-          <a:solidFill>
-            <a:schemeClr val="bg1">
-              <a:alpha val="80000"/>
-            </a:schemeClr>
-          </a:solidFill>
-          <a:ln>
-            <a:noFill/>
+          </a:prstGeom>
+          <a:ln w="22225">
+            <a:solidFill>
+              <a:srgbClr val="D9D9D9"/>
+            </a:solidFill>
           </a:ln>
         </p:spPr>
         <p:style>
-          <a:lnRef idx="2">
-            <a:schemeClr val="accent1">
-              <a:shade val="50000"/>
-            </a:schemeClr>
+          <a:lnRef idx="1">
+            <a:schemeClr val="accent1"/>
           </a:lnRef>
-          <a:fillRef idx="1">
+          <a:fillRef idx="0">
             <a:schemeClr val="accent1"/>
           </a:fillRef>
           <a:effectRef idx="0">
             <a:schemeClr val="accent1"/>
           </a:effectRef>
           <a:fontRef idx="minor">
-            <a:schemeClr val="lt1"/>
+            <a:schemeClr val="tx1"/>
           </a:fontRef>
         </p:style>
-        <p:txBody>
-          <a:bodyPr rtlCol="0" anchor="ctr"/>
-          <a:lstStyle/>
-          <a:p>
-            <a:pPr marL="0" marR="0" lvl="0" indent="0" algn="ctr" defTabSz="914400" rtl="0" eaLnBrk="1" fontAlgn="auto" latinLnBrk="0" hangingPunct="1">
-              <a:lnSpc>
-                <a:spcPct val="100000"/>
-              </a:lnSpc>
-              <a:spcBef>
-                <a:spcPts val="0"/>
-              </a:spcBef>
-              <a:spcAft>
-                <a:spcPts val="0"/>
-              </a:spcAft>
-              <a:buClrTx/>
-              <a:buSzTx/>
-              <a:buFontTx/>
-              <a:buNone/>
-              <a:tabLst/>
-              <a:defRPr/>
-            </a:pPr>
-            <a:endParaRPr kumimoji="0" lang="en-US" sz="1800" b="0" i="0" u="none" strike="noStrike" kern="1200" cap="none" spc="0" normalizeH="0" baseline="0" noProof="0">
-              <a:ln>
-                <a:noFill/>
-              </a:ln>
-              <a:solidFill>
-                <a:prstClr val="white"/>
-              </a:solidFill>
-              <a:effectLst/>
-              <a:uLnTx/>
-              <a:uFillTx/>
-              <a:latin typeface="Calibri" panose="020F0502020204030204"/>
-              <a:ea typeface="+mn-ea"/>
-              <a:cs typeface="+mn-cs"/>
-            </a:endParaRPr>
-          </a:p>
-        </p:txBody>
-      </p:sp>
-      <p:sp>
-        <p:nvSpPr>
-          <p:cNvPr id="14" name="Freeform: Shape 13">
-            <a:extLst>
-              <a:ext uri="{FF2B5EF4-FFF2-40B4-BE49-F238E27FC236}">
-                <a16:creationId xmlns:a16="http://schemas.microsoft.com/office/drawing/2014/main" id="{598EBA13-C937-430B-9523-439FE21096E6}"/>
-              </a:ext>
-              <a:ext uri="{C183D7F6-B498-43B3-948B-1728B52AA6E4}">
-                <adec:decorative xmlns:adec="http://schemas.microsoft.com/office/drawing/2017/decorative" val="1"/>
-              </a:ext>
-            </a:extLst>
-          </p:cNvPr>
-          <p:cNvSpPr>
-            <a:spLocks noGrp="1" noRot="1" noChangeAspect="1" noMove="1" noResize="1" noEditPoints="1" noAdjustHandles="1" noChangeArrowheads="1" noChangeShapeType="1" noTextEdit="1"/>
-          </p:cNvSpPr>
-          <p:nvPr>
-            <p:extLst>
-              <p:ext uri="{386F3935-93C4-4BCD-93E2-E3B085C9AB24}">
-                <p16:designElem xmlns:p16="http://schemas.microsoft.com/office/powerpoint/2015/main" val="1"/>
-              </p:ext>
-            </p:extLst>
-          </p:nvPr>
-        </p:nvSpPr>
-        <p:spPr>
-          <a:xfrm>
-            <a:off x="6021086" y="544777"/>
-            <a:ext cx="6170914" cy="6313225"/>
-          </a:xfrm>
-          <a:custGeom>
-            <a:avLst/>
-            <a:gdLst>
-              <a:gd name="connsiteX0" fmla="*/ 3397813 w 6170914"/>
-              <a:gd name="connsiteY0" fmla="*/ 0 h 6313225"/>
-              <a:gd name="connsiteX1" fmla="*/ 6019731 w 6170914"/>
-              <a:gd name="connsiteY1" fmla="*/ 1236489 h 6313225"/>
-              <a:gd name="connsiteX2" fmla="*/ 6170914 w 6170914"/>
-              <a:gd name="connsiteY2" fmla="*/ 1438663 h 6313225"/>
-              <a:gd name="connsiteX3" fmla="*/ 6170914 w 6170914"/>
-              <a:gd name="connsiteY3" fmla="*/ 5356963 h 6313225"/>
-              <a:gd name="connsiteX4" fmla="*/ 6019731 w 6170914"/>
-              <a:gd name="connsiteY4" fmla="*/ 5559138 h 6313225"/>
-              <a:gd name="connsiteX5" fmla="*/ 5194591 w 6170914"/>
-              <a:gd name="connsiteY5" fmla="*/ 6282226 h 6313225"/>
-              <a:gd name="connsiteX6" fmla="*/ 5141791 w 6170914"/>
-              <a:gd name="connsiteY6" fmla="*/ 6313225 h 6313225"/>
-              <a:gd name="connsiteX7" fmla="*/ 1659199 w 6170914"/>
-              <a:gd name="connsiteY7" fmla="*/ 6313225 h 6313225"/>
-              <a:gd name="connsiteX8" fmla="*/ 1498064 w 6170914"/>
-              <a:gd name="connsiteY8" fmla="*/ 6215333 h 6313225"/>
-              <a:gd name="connsiteX9" fmla="*/ 0 w 6170914"/>
-              <a:gd name="connsiteY9" fmla="*/ 3397813 h 6313225"/>
-              <a:gd name="connsiteX10" fmla="*/ 3397813 w 6170914"/>
-              <a:gd name="connsiteY10" fmla="*/ 0 h 6313225"/>
-            </a:gdLst>
-            <a:ahLst/>
-            <a:cxnLst>
-              <a:cxn ang="0">
-                <a:pos x="connsiteX0" y="connsiteY0"/>
-              </a:cxn>
-              <a:cxn ang="0">
-                <a:pos x="connsiteX1" y="connsiteY1"/>
-              </a:cxn>
-              <a:cxn ang="0">
-                <a:pos x="connsiteX2" y="connsiteY2"/>
-              </a:cxn>
-              <a:cxn ang="0">
-                <a:pos x="connsiteX3" y="connsiteY3"/>
-              </a:cxn>
-              <a:cxn ang="0">
-                <a:pos x="connsiteX4" y="connsiteY4"/>
-              </a:cxn>
-              <a:cxn ang="0">
-                <a:pos x="connsiteX5" y="connsiteY5"/>
-              </a:cxn>
-              <a:cxn ang="0">
-                <a:pos x="connsiteX6" y="connsiteY6"/>
-              </a:cxn>
-              <a:cxn ang="0">
-                <a:pos x="connsiteX7" y="connsiteY7"/>
-              </a:cxn>
-              <a:cxn ang="0">
-                <a:pos x="connsiteX8" y="connsiteY8"/>
-              </a:cxn>
-              <a:cxn ang="0">
-                <a:pos x="connsiteX9" y="connsiteY9"/>
-              </a:cxn>
-              <a:cxn ang="0">
-                <a:pos x="connsiteX10" y="connsiteY10"/>
-              </a:cxn>
-            </a:cxnLst>
-            <a:rect l="l" t="t" r="r" b="b"/>
-            <a:pathLst>
-              <a:path w="6170914" h="6313225">
-                <a:moveTo>
-                  <a:pt x="3397813" y="0"/>
-                </a:moveTo>
-                <a:cubicBezTo>
-                  <a:pt x="4453378" y="0"/>
-                  <a:pt x="5396522" y="481334"/>
-                  <a:pt x="6019731" y="1236489"/>
-                </a:cubicBezTo>
-                <a:lnTo>
-                  <a:pt x="6170914" y="1438663"/>
-                </a:lnTo>
-                <a:lnTo>
-                  <a:pt x="6170914" y="5356963"/>
-                </a:lnTo>
-                <a:lnTo>
-                  <a:pt x="6019731" y="5559138"/>
-                </a:lnTo>
-                <a:cubicBezTo>
-                  <a:pt x="5786028" y="5842321"/>
-                  <a:pt x="5507333" y="6086998"/>
-                  <a:pt x="5194591" y="6282226"/>
-                </a:cubicBezTo>
-                <a:lnTo>
-                  <a:pt x="5141791" y="6313225"/>
-                </a:lnTo>
-                <a:lnTo>
-                  <a:pt x="1659199" y="6313225"/>
-                </a:lnTo>
-                <a:lnTo>
-                  <a:pt x="1498064" y="6215333"/>
-                </a:lnTo>
-                <a:cubicBezTo>
-                  <a:pt x="594240" y="5604721"/>
-                  <a:pt x="0" y="4570663"/>
-                  <a:pt x="0" y="3397813"/>
-                </a:cubicBezTo>
-                <a:cubicBezTo>
-                  <a:pt x="0" y="1521253"/>
-                  <a:pt x="1521253" y="0"/>
-                  <a:pt x="3397813" y="0"/>
-                </a:cubicBezTo>
-                <a:close/>
-              </a:path>
-            </a:pathLst>
-          </a:custGeom>
-          <a:solidFill>
-            <a:schemeClr val="bg1"/>
-          </a:solidFill>
-          <a:ln>
-            <a:noFill/>
-          </a:ln>
-        </p:spPr>
-        <p:style>
-          <a:lnRef idx="2">
-            <a:schemeClr val="accent1">
-              <a:shade val="50000"/>
-            </a:schemeClr>
-          </a:lnRef>
-          <a:fillRef idx="1">
-            <a:schemeClr val="accent1"/>
-          </a:fillRef>
-          <a:effectRef idx="0">
-            <a:schemeClr val="accent1"/>
-          </a:effectRef>
-          <a:fontRef idx="minor">
-            <a:schemeClr val="lt1"/>
-          </a:fontRef>
-        </p:style>
-        <p:txBody>
-          <a:bodyPr rtlCol="0" anchor="ctr"/>
-          <a:lstStyle/>
-          <a:p>
-            <a:pPr marL="0" marR="0" lvl="0" indent="0" algn="ctr" defTabSz="914400" rtl="0" eaLnBrk="1" fontAlgn="auto" latinLnBrk="0" hangingPunct="1">
-              <a:lnSpc>
-                <a:spcPct val="100000"/>
-              </a:lnSpc>
-              <a:spcBef>
-                <a:spcPts val="0"/>
-              </a:spcBef>
-              <a:spcAft>
-                <a:spcPts val="0"/>
-              </a:spcAft>
-              <a:buClrTx/>
-              <a:buSzTx/>
-              <a:buFontTx/>
-              <a:buNone/>
-              <a:tabLst/>
-              <a:defRPr/>
-            </a:pPr>
-            <a:endParaRPr kumimoji="0" lang="en-US" sz="1800" b="0" i="0" u="none" strike="noStrike" kern="1200" cap="none" spc="0" normalizeH="0" baseline="0" noProof="0">
-              <a:ln>
-                <a:noFill/>
-              </a:ln>
-              <a:solidFill>
-                <a:prstClr val="white"/>
-              </a:solidFill>
-              <a:effectLst/>
-              <a:uLnTx/>
-              <a:uFillTx/>
-              <a:latin typeface="Calibri" panose="020F0502020204030204"/>
-              <a:ea typeface="+mn-ea"/>
-              <a:cs typeface="+mn-cs"/>
-            </a:endParaRPr>
-          </a:p>
-        </p:txBody>
-      </p:sp>
+      </p:cxnSp>
       <p:pic>
         <p:nvPicPr>
           <p:cNvPr id="11" name="Graphic 6">
@@ -9677,8 +10640,90 @@
         </p:blipFill>
         <p:spPr>
           <a:xfrm>
-            <a:off x="7210424" y="1845770"/>
-            <a:ext cx="4333875" cy="4333875"/>
+            <a:off x="1060707" y="2426818"/>
+            <a:ext cx="3997637" cy="3997637"/>
+          </a:xfrm>
+          <a:prstGeom prst="rect">
+            <a:avLst/>
+          </a:prstGeom>
+        </p:spPr>
+      </p:pic>
+      <p:cxnSp>
+        <p:nvCxnSpPr>
+          <p:cNvPr id="23" name="Straight Connector 22">
+            <a:extLst>
+              <a:ext uri="{FF2B5EF4-FFF2-40B4-BE49-F238E27FC236}">
+                <a16:creationId xmlns:a16="http://schemas.microsoft.com/office/drawing/2014/main" id="{DB146403-F3D6-484B-B2ED-97F9565D0370}"/>
+              </a:ext>
+              <a:ext uri="{C183D7F6-B498-43B3-948B-1728B52AA6E4}">
+                <adec:decorative xmlns:adec="http://schemas.microsoft.com/office/drawing/2017/decorative" val="1"/>
+              </a:ext>
+            </a:extLst>
+          </p:cNvPr>
+          <p:cNvCxnSpPr>
+            <a:cxnSpLocks noGrp="1" noRot="1" noChangeAspect="1" noMove="1" noResize="1" noEditPoints="1" noAdjustHandles="1" noChangeArrowheads="1" noChangeShapeType="1"/>
+          </p:cNvCxnSpPr>
+          <p:nvPr>
+            <p:extLst>
+              <p:ext uri="{386F3935-93C4-4BCD-93E2-E3B085C9AB24}">
+                <p16:designElem xmlns:p16="http://schemas.microsoft.com/office/powerpoint/2015/main" val="1"/>
+              </p:ext>
+            </p:extLst>
+          </p:nvPr>
+        </p:nvCxnSpPr>
+        <p:spPr>
+          <a:xfrm>
+            <a:off x="6116278" y="2596836"/>
+            <a:ext cx="0" cy="3657600"/>
+          </a:xfrm>
+          <a:prstGeom prst="line">
+            <a:avLst/>
+          </a:prstGeom>
+          <a:ln w="101600" cmpd="dbl">
+            <a:solidFill>
+              <a:srgbClr val="595959"/>
+            </a:solidFill>
+          </a:ln>
+        </p:spPr>
+        <p:style>
+          <a:lnRef idx="1">
+            <a:schemeClr val="accent1"/>
+          </a:lnRef>
+          <a:fillRef idx="0">
+            <a:schemeClr val="accent1"/>
+          </a:fillRef>
+          <a:effectRef idx="0">
+            <a:schemeClr val="accent1"/>
+          </a:effectRef>
+          <a:fontRef idx="minor">
+            <a:schemeClr val="tx1"/>
+          </a:fontRef>
+        </p:style>
+      </p:cxnSp>
+      <p:pic>
+        <p:nvPicPr>
+          <p:cNvPr id="4" name="Image 3">
+            <a:extLst>
+              <a:ext uri="{FF2B5EF4-FFF2-40B4-BE49-F238E27FC236}">
+                <a16:creationId xmlns:a16="http://schemas.microsoft.com/office/drawing/2014/main" id="{E97A8F1A-606B-459E-987B-ABFF28844D1E}"/>
+              </a:ext>
+            </a:extLst>
+          </p:cNvPr>
+          <p:cNvPicPr>
+            <a:picLocks noChangeAspect="1"/>
+          </p:cNvPicPr>
+          <p:nvPr/>
+        </p:nvPicPr>
+        <p:blipFill>
+          <a:blip r:embed="rId4"/>
+          <a:stretch>
+            <a:fillRect/>
+          </a:stretch>
+        </p:blipFill>
+        <p:spPr>
+          <a:xfrm>
+            <a:off x="6445073" y="2488785"/>
+            <a:ext cx="5455917" cy="3873702"/>
           </a:xfrm>
           <a:prstGeom prst="rect">
             <a:avLst/>
@@ -9699,8 +10744,8 @@
         </p:nvSpPr>
         <p:spPr>
           <a:xfrm>
-            <a:off x="1131215" y="1894788"/>
-            <a:ext cx="3026005" cy="1477328"/>
+            <a:off x="2032339" y="2317325"/>
+            <a:ext cx="3026005" cy="2416046"/>
           </a:xfrm>
           <a:prstGeom prst="rect">
             <a:avLst/>
@@ -9713,21 +10758,57 @@
           </a:bodyPr>
           <a:lstStyle/>
           <a:p>
+            <a:pPr>
+              <a:spcAft>
+                <a:spcPts val="600"/>
+              </a:spcAft>
+            </a:pPr>
             <a:r>
               <a:rPr lang="fr-FR" dirty="0"/>
-              <a:t>Les attentes du projet :</a:t>
+              <a:t>Les attentes des fonctionnalités du projet :</a:t>
             </a:r>
           </a:p>
           <a:p>
+            <a:pPr>
+              <a:spcAft>
+                <a:spcPts val="600"/>
+              </a:spcAft>
+            </a:pPr>
+            <a:r>
+              <a:rPr lang="fr-FR" dirty="0"/>
+              <a:t>		</a:t>
+            </a:r>
+          </a:p>
+          <a:p>
+            <a:pPr>
+              <a:spcAft>
+                <a:spcPts val="600"/>
+              </a:spcAft>
+            </a:pPr>
             <a:endParaRPr lang="fr-FR" dirty="0"/>
           </a:p>
           <a:p>
+            <a:pPr>
+              <a:spcAft>
+                <a:spcPts val="600"/>
+              </a:spcAft>
+            </a:pPr>
             <a:endParaRPr lang="fr-FR" dirty="0"/>
           </a:p>
           <a:p>
+            <a:pPr>
+              <a:spcAft>
+                <a:spcPts val="600"/>
+              </a:spcAft>
+            </a:pPr>
             <a:endParaRPr lang="fr-FR" dirty="0"/>
           </a:p>
           <a:p>
+            <a:pPr>
+              <a:spcAft>
+                <a:spcPts val="600"/>
+              </a:spcAft>
+            </a:pPr>
             <a:endParaRPr lang="fr-FR" dirty="0"/>
           </a:p>
         </p:txBody>
@@ -10305,12 +11386,12 @@
           <a:chExt cx="0" cy="0"/>
         </a:xfrm>
       </p:grpSpPr>
-      <p:sp>
+      <p:sp useBgFill="1">
         <p:nvSpPr>
-          <p:cNvPr id="11" name="Rectangle 11">
+          <p:cNvPr id="20" name="Rectangle 19">
             <a:extLst>
               <a:ext uri="{FF2B5EF4-FFF2-40B4-BE49-F238E27FC236}">
-                <a16:creationId xmlns:a16="http://schemas.microsoft.com/office/drawing/2014/main" id="{823AC064-BC96-4F32-8AE1-B2FD38754823}"/>
+                <a16:creationId xmlns:a16="http://schemas.microsoft.com/office/drawing/2014/main" id="{FDC05A7B-3060-4D55-AD98-5814F79D46C2}"/>
               </a:ext>
               <a:ext uri="{C183D7F6-B498-43B3-948B-1728B52AA6E4}">
                 <adec:decorative xmlns:adec="http://schemas.microsoft.com/office/drawing/2017/decorative" val="1"/>
@@ -10328,21 +11409,16 @@
             </p:extLst>
           </p:nvPr>
         </p:nvSpPr>
-        <p:spPr bwMode="ltGray">
+        <p:spPr>
           <a:xfrm>
-            <a:off x="396882" y="280374"/>
-            <a:ext cx="11438793" cy="1844256"/>
+            <a:off x="0" y="0"/>
+            <a:ext cx="12192000" cy="6858000"/>
           </a:xfrm>
           <a:prstGeom prst="rect">
             <a:avLst/>
           </a:prstGeom>
-          <a:solidFill>
-            <a:srgbClr val="404040"/>
-          </a:solidFill>
-          <a:ln w="127000" cap="sq" cmpd="thinThick">
-            <a:solidFill>
-              <a:srgbClr val="404040"/>
-            </a:solidFill>
+          <a:ln>
+            <a:noFill/>
           </a:ln>
         </p:spPr>
         <p:style>
@@ -10370,6 +11446,105 @@
           </a:p>
         </p:txBody>
       </p:sp>
+      <p:sp useBgFill="1">
+        <p:nvSpPr>
+          <p:cNvPr id="22" name="Rectangle 21">
+            <a:extLst>
+              <a:ext uri="{FF2B5EF4-FFF2-40B4-BE49-F238E27FC236}">
+                <a16:creationId xmlns:a16="http://schemas.microsoft.com/office/drawing/2014/main" id="{A3473CF9-37EB-43E7-89EF-D2D1C53D1DAC}"/>
+              </a:ext>
+              <a:ext uri="{C183D7F6-B498-43B3-948B-1728B52AA6E4}">
+                <adec:decorative xmlns:adec="http://schemas.microsoft.com/office/drawing/2017/decorative" val="1"/>
+              </a:ext>
+            </a:extLst>
+          </p:cNvPr>
+          <p:cNvSpPr>
+            <a:spLocks noGrp="1" noRot="1" noChangeAspect="1" noMove="1" noResize="1" noEditPoints="1" noAdjustHandles="1" noChangeArrowheads="1" noChangeShapeType="1" noTextEdit="1"/>
+          </p:cNvSpPr>
+          <p:nvPr>
+            <p:extLst>
+              <p:ext uri="{386F3935-93C4-4BCD-93E2-E3B085C9AB24}">
+                <p16:designElem xmlns:p16="http://schemas.microsoft.com/office/powerpoint/2015/main" val="1"/>
+              </p:ext>
+            </p:extLst>
+          </p:nvPr>
+        </p:nvSpPr>
+        <p:spPr>
+          <a:xfrm>
+            <a:off x="1903615" y="4638503"/>
+            <a:ext cx="8384770" cy="1332634"/>
+          </a:xfrm>
+          <a:prstGeom prst="rect">
+            <a:avLst/>
+          </a:prstGeom>
+          <a:ln w="12700">
+            <a:solidFill>
+              <a:srgbClr val="DEDEDE"/>
+            </a:solidFill>
+          </a:ln>
+          <a:effectLst>
+            <a:outerShdw blurRad="50800" dist="38100" dir="2700000" algn="tl" rotWithShape="0">
+              <a:schemeClr val="bg2">
+                <a:lumMod val="85000"/>
+                <a:alpha val="50000"/>
+              </a:schemeClr>
+            </a:outerShdw>
+          </a:effectLst>
+        </p:spPr>
+        <p:style>
+          <a:lnRef idx="2">
+            <a:schemeClr val="accent1">
+              <a:shade val="50000"/>
+            </a:schemeClr>
+          </a:lnRef>
+          <a:fillRef idx="1">
+            <a:schemeClr val="accent1"/>
+          </a:fillRef>
+          <a:effectRef idx="0">
+            <a:schemeClr val="accent1"/>
+          </a:effectRef>
+          <a:fontRef idx="minor">
+            <a:schemeClr val="lt1"/>
+          </a:fontRef>
+        </p:style>
+        <p:txBody>
+          <a:bodyPr rtlCol="0" anchor="ctr"/>
+          <a:lstStyle/>
+          <a:p>
+            <a:pPr marL="0" marR="0" lvl="0" indent="0" algn="ctr" defTabSz="914400" rtl="0" eaLnBrk="1" fontAlgn="auto" latinLnBrk="0" hangingPunct="1">
+              <a:lnSpc>
+                <a:spcPct val="100000"/>
+              </a:lnSpc>
+              <a:spcBef>
+                <a:spcPts val="0"/>
+              </a:spcBef>
+              <a:spcAft>
+                <a:spcPts val="0"/>
+              </a:spcAft>
+              <a:buClrTx/>
+              <a:buSzTx/>
+              <a:buFontTx/>
+              <a:buNone/>
+              <a:tabLst/>
+              <a:defRPr/>
+            </a:pPr>
+            <a:endParaRPr kumimoji="0" lang="en-US" sz="1800" b="0" i="0" u="none" strike="noStrike" kern="1200" cap="none" spc="0" normalizeH="0" baseline="0" noProof="0">
+              <a:ln>
+                <a:noFill/>
+              </a:ln>
+              <a:solidFill>
+                <a:prstClr val="white"/>
+              </a:solidFill>
+              <a:effectLst/>
+              <a:uLnTx/>
+              <a:uFillTx/>
+              <a:latin typeface="Calibri" panose="020F0502020204030204"/>
+              <a:ea typeface="+mn-ea"/>
+              <a:cs typeface="+mn-cs"/>
+            </a:endParaRPr>
+          </a:p>
+        </p:txBody>
+      </p:sp>
       <p:sp>
         <p:nvSpPr>
           <p:cNvPr id="2" name="Titre 1">
@@ -10388,64 +11563,39 @@
         </p:nvSpPr>
         <p:spPr>
           <a:xfrm>
-            <a:off x="546351" y="433545"/>
-            <a:ext cx="11139854" cy="930447"/>
+            <a:off x="2103121" y="4727173"/>
+            <a:ext cx="7985759" cy="868823"/>
           </a:xfrm>
         </p:spPr>
         <p:txBody>
-          <a:bodyPr vert="horz" lIns="91440" tIns="45720" rIns="91440" bIns="45720" rtlCol="0" anchor="b">
+          <a:bodyPr vert="horz" lIns="91440" tIns="45720" rIns="91440" bIns="45720" rtlCol="0" anchor="ctr">
             <a:normAutofit/>
           </a:bodyPr>
           <a:lstStyle/>
           <a:p>
             <a:pPr algn="ctr"/>
             <a:r>
-              <a:rPr lang="en-US" sz="5400" dirty="0" err="1">
-                <a:solidFill>
-                  <a:srgbClr val="FFFFFF"/>
-                </a:solidFill>
-              </a:rPr>
-              <a:t>Logiciels</a:t>
+              <a:rPr lang="en-US" sz="4000"/>
+              <a:t>Logiciels Utilisés</a:t>
             </a:r>
-            <a:r>
-              <a:rPr lang="en-US" sz="5400" dirty="0">
-                <a:solidFill>
-                  <a:srgbClr val="FFFFFF"/>
-                </a:solidFill>
-              </a:rPr>
-              <a:t> </a:t>
-            </a:r>
-            <a:r>
-              <a:rPr lang="en-US" sz="5400" dirty="0" err="1">
-                <a:solidFill>
-                  <a:srgbClr val="FFFFFF"/>
-                </a:solidFill>
-              </a:rPr>
-              <a:t>Utilisés</a:t>
-            </a:r>
-            <a:endParaRPr lang="en-US" sz="5400" dirty="0">
-              <a:solidFill>
-                <a:srgbClr val="FFFFFF"/>
-              </a:solidFill>
-            </a:endParaRPr>
           </a:p>
         </p:txBody>
       </p:sp>
-      <p:cxnSp>
-        <p:nvCxnSpPr>
-          <p:cNvPr id="13" name="Straight Connector 13">
+      <p:sp>
+        <p:nvSpPr>
+          <p:cNvPr id="24" name="Rectangle: Rounded Corners 23">
             <a:extLst>
               <a:ext uri="{FF2B5EF4-FFF2-40B4-BE49-F238E27FC236}">
-                <a16:creationId xmlns:a16="http://schemas.microsoft.com/office/drawing/2014/main" id="{7E7C77BC-7138-40B1-A15B-20F57A494629}"/>
+                <a16:creationId xmlns:a16="http://schemas.microsoft.com/office/drawing/2014/main" id="{586B4EF9-43BA-4655-A6FF-1D8E21574C95}"/>
               </a:ext>
               <a:ext uri="{C183D7F6-B498-43B3-948B-1728B52AA6E4}">
                 <adec:decorative xmlns:adec="http://schemas.microsoft.com/office/drawing/2017/decorative" val="1"/>
               </a:ext>
             </a:extLst>
           </p:cNvPr>
-          <p:cNvCxnSpPr>
-            <a:cxnSpLocks noGrp="1" noRot="1" noChangeAspect="1" noMove="1" noResize="1" noEditPoints="1" noAdjustHandles="1" noChangeArrowheads="1" noChangeShapeType="1"/>
-          </p:cNvCxnSpPr>
+          <p:cNvSpPr>
+            <a:spLocks noGrp="1" noRot="1" noChangeAspect="1" noMove="1" noResize="1" noEditPoints="1" noAdjustHandles="1" noChangeArrowheads="1" noChangeShapeType="1" noTextEdit="1"/>
+          </p:cNvSpPr>
           <p:nvPr>
             <p:extLst>
               <p:ext uri="{386F3935-93C4-4BCD-93E2-E3B085C9AB24}">
@@ -10453,36 +11603,78 @@
               </p:ext>
             </p:extLst>
           </p:nvPr>
-        </p:nvCxnSpPr>
+        </p:nvSpPr>
         <p:spPr>
           <a:xfrm>
-            <a:off x="2230078" y="1522292"/>
-            <a:ext cx="7772400" cy="0"/>
+            <a:off x="2483110" y="5628237"/>
+            <a:ext cx="7225780" cy="685800"/>
           </a:xfrm>
-          <a:prstGeom prst="line">
-            <a:avLst/>
+          <a:prstGeom prst="roundRect">
+            <a:avLst>
+              <a:gd name="adj" fmla="val 0"/>
+            </a:avLst>
           </a:prstGeom>
-          <a:ln w="22225">
-            <a:solidFill>
-              <a:srgbClr val="D9D9D9"/>
-            </a:solidFill>
+          <a:solidFill>
+            <a:schemeClr val="accent2"/>
+          </a:solidFill>
+          <a:ln>
+            <a:noFill/>
           </a:ln>
         </p:spPr>
         <p:style>
-          <a:lnRef idx="1">
-            <a:schemeClr val="accent1"/>
+          <a:lnRef idx="2">
+            <a:schemeClr val="accent1">
+              <a:shade val="50000"/>
+            </a:schemeClr>
           </a:lnRef>
-          <a:fillRef idx="0">
+          <a:fillRef idx="1">
             <a:schemeClr val="accent1"/>
           </a:fillRef>
           <a:effectRef idx="0">
             <a:schemeClr val="accent1"/>
           </a:effectRef>
           <a:fontRef idx="minor">
-            <a:schemeClr val="tx1"/>
+            <a:schemeClr val="lt1"/>
           </a:fontRef>
         </p:style>
-      </p:cxnSp>
+        <p:txBody>
+          <a:bodyPr rtlCol="0" anchor="ctr"/>
+          <a:lstStyle/>
+          <a:p>
+            <a:pPr marL="0" marR="0" lvl="0" indent="0" algn="ctr" defTabSz="914400" rtl="0" eaLnBrk="1" fontAlgn="auto" latinLnBrk="0" hangingPunct="1">
+              <a:lnSpc>
+                <a:spcPct val="100000"/>
+              </a:lnSpc>
+              <a:spcBef>
+                <a:spcPts val="0"/>
+              </a:spcBef>
+              <a:spcAft>
+                <a:spcPts val="0"/>
+              </a:spcAft>
+              <a:buClrTx/>
+              <a:buSzTx/>
+              <a:buFontTx/>
+              <a:buNone/>
+              <a:tabLst/>
+              <a:defRPr/>
+            </a:pPr>
+            <a:endParaRPr kumimoji="0" lang="en-US" sz="1800" b="0" i="0" u="none" strike="noStrike" kern="1200" cap="none" spc="0" normalizeH="0" baseline="0" noProof="0">
+              <a:ln>
+                <a:noFill/>
+              </a:ln>
+              <a:solidFill>
+                <a:prstClr val="white"/>
+              </a:solidFill>
+              <a:effectLst/>
+              <a:uLnTx/>
+              <a:uFillTx/>
+              <a:latin typeface="Avenir Next LT Pro"/>
+              <a:ea typeface="+mn-ea"/>
+              <a:cs typeface="+mn-cs"/>
+            </a:endParaRPr>
+          </a:p>
+        </p:txBody>
+      </p:sp>
       <p:pic>
         <p:nvPicPr>
           <p:cNvPr id="7" name="Image 6">
@@ -10511,66 +11703,50 @@
         </p:blipFill>
         <p:spPr>
           <a:xfrm>
-            <a:off x="1060707" y="2426818"/>
-            <a:ext cx="3997637" cy="3997637"/>
+            <a:off x="320752" y="494884"/>
+            <a:ext cx="3703320" cy="3703320"/>
           </a:xfrm>
           <a:prstGeom prst="rect">
             <a:avLst/>
           </a:prstGeom>
         </p:spPr>
       </p:pic>
-      <p:cxnSp>
-        <p:nvCxnSpPr>
-          <p:cNvPr id="15" name="Straight Connector 15">
+      <p:pic>
+        <p:nvPicPr>
+          <p:cNvPr id="4" name="Image 3" descr="Une image contenant dessin&#10;&#10;Description générée automatiquement">
             <a:extLst>
               <a:ext uri="{FF2B5EF4-FFF2-40B4-BE49-F238E27FC236}">
-                <a16:creationId xmlns:a16="http://schemas.microsoft.com/office/drawing/2014/main" id="{DB146403-F3D6-484B-B2ED-97F9565D0370}"/>
-              </a:ext>
-              <a:ext uri="{C183D7F6-B498-43B3-948B-1728B52AA6E4}">
-                <adec:decorative xmlns:adec="http://schemas.microsoft.com/office/drawing/2017/decorative" val="1"/>
+                <a16:creationId xmlns:a16="http://schemas.microsoft.com/office/drawing/2014/main" id="{1BCC562F-344E-4768-8E0E-AF13687ECED4}"/>
               </a:ext>
             </a:extLst>
           </p:cNvPr>
-          <p:cNvCxnSpPr>
-            <a:cxnSpLocks noGrp="1" noRot="1" noChangeAspect="1" noMove="1" noResize="1" noEditPoints="1" noAdjustHandles="1" noChangeArrowheads="1" noChangeShapeType="1"/>
-          </p:cNvCxnSpPr>
-          <p:nvPr>
-            <p:extLst>
-              <p:ext uri="{386F3935-93C4-4BCD-93E2-E3B085C9AB24}">
-                <p16:designElem xmlns:p16="http://schemas.microsoft.com/office/powerpoint/2015/main" val="1"/>
-              </p:ext>
-            </p:extLst>
-          </p:nvPr>
-        </p:nvCxnSpPr>
+          <p:cNvPicPr>
+            <a:picLocks noChangeAspect="1"/>
+          </p:cNvPicPr>
+          <p:nvPr/>
+        </p:nvPicPr>
+        <p:blipFill>
+          <a:blip r:embed="rId3">
+            <a:extLst>
+              <a:ext uri="{28A0092B-C50C-407E-A947-70E740481C1C}">
+                <a14:useLocalDpi xmlns:a14="http://schemas.microsoft.com/office/drawing/2010/main" val="0"/>
+              </a:ext>
+            </a:extLst>
+          </a:blip>
+          <a:stretch>
+            <a:fillRect/>
+          </a:stretch>
+        </p:blipFill>
         <p:spPr>
           <a:xfrm>
-            <a:off x="6116278" y="2596836"/>
-            <a:ext cx="0" cy="3657600"/>
+            <a:off x="4244340" y="494884"/>
+            <a:ext cx="3703320" cy="3703320"/>
           </a:xfrm>
-          <a:prstGeom prst="line">
+          <a:prstGeom prst="rect">
             <a:avLst/>
           </a:prstGeom>
-          <a:ln w="101600" cmpd="dbl">
-            <a:solidFill>
-              <a:srgbClr val="595959"/>
-            </a:solidFill>
-          </a:ln>
         </p:spPr>
-        <p:style>
-          <a:lnRef idx="1">
-            <a:schemeClr val="accent1"/>
-          </a:lnRef>
-          <a:fillRef idx="0">
-            <a:schemeClr val="accent1"/>
-          </a:fillRef>
-          <a:effectRef idx="0">
-            <a:schemeClr val="accent1"/>
-          </a:effectRef>
-          <a:fontRef idx="minor">
-            <a:schemeClr val="tx1"/>
-          </a:fontRef>
-        </p:style>
-      </p:cxnSp>
+      </p:pic>
       <p:pic>
         <p:nvPicPr>
           <p:cNvPr id="5" name="Espace réservé du contenu 4" descr="Une image contenant signe, horloge&#10;&#10;Description générée automatiquement">
@@ -10588,7 +11764,7 @@
           </p:nvPr>
         </p:nvPicPr>
         <p:blipFill>
-          <a:blip r:embed="rId3">
+          <a:blip r:embed="rId4">
             <a:extLst>
               <a:ext uri="{28A0092B-C50C-407E-A947-70E740481C1C}">
                 <a14:useLocalDpi xmlns:a14="http://schemas.microsoft.com/office/drawing/2010/main" val="0"/>
@@ -10601,8 +11777,8 @@
         </p:blipFill>
         <p:spPr>
           <a:xfrm>
-            <a:off x="6445073" y="3389012"/>
-            <a:ext cx="5455917" cy="2073248"/>
+            <a:off x="8167928" y="1642914"/>
+            <a:ext cx="3703320" cy="1407261"/>
           </a:xfrm>
           <a:prstGeom prst="rect">
             <a:avLst/>
@@ -10625,6 +11801,14 @@
 <file path=ppt/slides/slide7.xml><?xml version="1.0" encoding="utf-8"?>
 <p:sld xmlns:a="http://schemas.openxmlformats.org/drawingml/2006/main" xmlns:r="http://schemas.openxmlformats.org/officeDocument/2006/relationships" xmlns:p="http://schemas.openxmlformats.org/presentationml/2006/main">
   <p:cSld>
+    <p:bg>
+      <p:bgPr>
+        <a:solidFill>
+          <a:schemeClr val="bg1"/>
+        </a:solidFill>
+        <a:effectLst/>
+      </p:bgPr>
+    </p:bg>
     <p:spTree>
       <p:nvGrpSpPr>
         <p:cNvPr id="1" name=""/>
@@ -10639,6 +11823,165 @@
           <a:chExt cx="0" cy="0"/>
         </a:xfrm>
       </p:grpSpPr>
+      <p:sp useBgFill="1">
+        <p:nvSpPr>
+          <p:cNvPr id="7" name="Rectangle 9">
+            <a:extLst>
+              <a:ext uri="{FF2B5EF4-FFF2-40B4-BE49-F238E27FC236}">
+                <a16:creationId xmlns:a16="http://schemas.microsoft.com/office/drawing/2014/main" id="{C1A1C5D3-C053-4EE9-BE1A-419B6E27CCAE}"/>
+              </a:ext>
+              <a:ext uri="{C183D7F6-B498-43B3-948B-1728B52AA6E4}">
+                <adec:decorative xmlns:adec="http://schemas.microsoft.com/office/drawing/2017/decorative" val="1"/>
+              </a:ext>
+            </a:extLst>
+          </p:cNvPr>
+          <p:cNvSpPr>
+            <a:spLocks noGrp="1" noRot="1" noChangeAspect="1" noMove="1" noResize="1" noEditPoints="1" noAdjustHandles="1" noChangeArrowheads="1" noChangeShapeType="1" noTextEdit="1"/>
+          </p:cNvSpPr>
+          <p:nvPr>
+            <p:extLst>
+              <p:ext uri="{386F3935-93C4-4BCD-93E2-E3B085C9AB24}">
+                <p16:designElem xmlns:p16="http://schemas.microsoft.com/office/powerpoint/2015/main" val="1"/>
+              </p:ext>
+            </p:extLst>
+          </p:nvPr>
+        </p:nvSpPr>
+        <p:spPr>
+          <a:xfrm>
+            <a:off x="0" y="0"/>
+            <a:ext cx="12192000" cy="6858000"/>
+          </a:xfrm>
+          <a:prstGeom prst="rect">
+            <a:avLst/>
+          </a:prstGeom>
+          <a:ln>
+            <a:noFill/>
+          </a:ln>
+        </p:spPr>
+        <p:style>
+          <a:lnRef idx="2">
+            <a:schemeClr val="accent1">
+              <a:shade val="50000"/>
+            </a:schemeClr>
+          </a:lnRef>
+          <a:fillRef idx="1">
+            <a:schemeClr val="accent1"/>
+          </a:fillRef>
+          <a:effectRef idx="0">
+            <a:schemeClr val="accent1"/>
+          </a:effectRef>
+          <a:fontRef idx="minor">
+            <a:schemeClr val="lt1"/>
+          </a:fontRef>
+        </p:style>
+        <p:txBody>
+          <a:bodyPr rtlCol="0" anchor="ctr"/>
+          <a:lstStyle/>
+          <a:p>
+            <a:pPr algn="ctr"/>
+            <a:endParaRPr lang="en-US"/>
+          </a:p>
+        </p:txBody>
+      </p:sp>
+      <p:sp useBgFill="1">
+        <p:nvSpPr>
+          <p:cNvPr id="8" name="Rectangle 11">
+            <a:extLst>
+              <a:ext uri="{FF2B5EF4-FFF2-40B4-BE49-F238E27FC236}">
+                <a16:creationId xmlns:a16="http://schemas.microsoft.com/office/drawing/2014/main" id="{A3473CF9-37EB-43E7-89EF-D2D1C53D1DAC}"/>
+              </a:ext>
+              <a:ext uri="{C183D7F6-B498-43B3-948B-1728B52AA6E4}">
+                <adec:decorative xmlns:adec="http://schemas.microsoft.com/office/drawing/2017/decorative" val="1"/>
+              </a:ext>
+            </a:extLst>
+          </p:cNvPr>
+          <p:cNvSpPr>
+            <a:spLocks noGrp="1" noRot="1" noChangeAspect="1" noMove="1" noResize="1" noEditPoints="1" noAdjustHandles="1" noChangeArrowheads="1" noChangeShapeType="1" noTextEdit="1"/>
+          </p:cNvSpPr>
+          <p:nvPr>
+            <p:extLst>
+              <p:ext uri="{386F3935-93C4-4BCD-93E2-E3B085C9AB24}">
+                <p16:designElem xmlns:p16="http://schemas.microsoft.com/office/powerpoint/2015/main" val="1"/>
+              </p:ext>
+            </p:extLst>
+          </p:nvPr>
+        </p:nvSpPr>
+        <p:spPr>
+          <a:xfrm>
+            <a:off x="1903615" y="221673"/>
+            <a:ext cx="8384770" cy="1332634"/>
+          </a:xfrm>
+          <a:prstGeom prst="rect">
+            <a:avLst/>
+          </a:prstGeom>
+          <a:ln w="12700">
+            <a:solidFill>
+              <a:srgbClr val="E1E1E1"/>
+            </a:solidFill>
+          </a:ln>
+          <a:effectLst>
+            <a:outerShdw blurRad="50800" dist="38100" dir="2700000" algn="tl" rotWithShape="0">
+              <a:schemeClr val="bg2">
+                <a:lumMod val="85000"/>
+                <a:alpha val="50000"/>
+              </a:schemeClr>
+            </a:outerShdw>
+          </a:effectLst>
+        </p:spPr>
+        <p:style>
+          <a:lnRef idx="2">
+            <a:schemeClr val="accent1">
+              <a:shade val="50000"/>
+            </a:schemeClr>
+          </a:lnRef>
+          <a:fillRef idx="1">
+            <a:schemeClr val="accent1"/>
+          </a:fillRef>
+          <a:effectRef idx="0">
+            <a:schemeClr val="accent1"/>
+          </a:effectRef>
+          <a:fontRef idx="minor">
+            <a:schemeClr val="lt1"/>
+          </a:fontRef>
+        </p:style>
+        <p:txBody>
+          <a:bodyPr rtlCol="0" anchor="ctr"/>
+          <a:lstStyle/>
+          <a:p>
+            <a:pPr marL="0" marR="0" lvl="0" indent="0" algn="ctr" defTabSz="914400" rtl="0" eaLnBrk="1" fontAlgn="auto" latinLnBrk="0" hangingPunct="1">
+              <a:lnSpc>
+                <a:spcPct val="100000"/>
+              </a:lnSpc>
+              <a:spcBef>
+                <a:spcPts val="0"/>
+              </a:spcBef>
+              <a:spcAft>
+                <a:spcPts val="0"/>
+              </a:spcAft>
+              <a:buClrTx/>
+              <a:buSzTx/>
+              <a:buFontTx/>
+              <a:buNone/>
+              <a:tabLst/>
+              <a:defRPr/>
+            </a:pPr>
+            <a:endParaRPr kumimoji="0" lang="en-US" sz="1800" b="0" i="0" u="none" strike="noStrike" kern="1200" cap="none" spc="0" normalizeH="0" baseline="0" noProof="0">
+              <a:ln>
+                <a:noFill/>
+              </a:ln>
+              <a:solidFill>
+                <a:prstClr val="white"/>
+              </a:solidFill>
+              <a:effectLst/>
+              <a:uLnTx/>
+              <a:uFillTx/>
+              <a:latin typeface="Calibri" panose="020F0502020204030204"/>
+              <a:ea typeface="+mn-ea"/>
+              <a:cs typeface="+mn-cs"/>
+            </a:endParaRPr>
+          </a:p>
+        </p:txBody>
+      </p:sp>
       <p:sp>
         <p:nvSpPr>
           <p:cNvPr id="2" name="Titre 1">
@@ -10655,25 +11998,425 @@
             <p:ph type="title"/>
           </p:nvPr>
         </p:nvSpPr>
-        <p:spPr/>
+        <p:spPr>
+          <a:xfrm>
+            <a:off x="2103121" y="310343"/>
+            <a:ext cx="7985759" cy="868823"/>
+          </a:xfrm>
+        </p:spPr>
         <p:txBody>
-          <a:bodyPr/>
+          <a:bodyPr vert="horz" lIns="91440" tIns="45720" rIns="91440" bIns="45720" rtlCol="0" anchor="ctr">
+            <a:normAutofit/>
+          </a:bodyPr>
           <a:lstStyle/>
           <a:p>
             <a:pPr algn="ctr"/>
             <a:r>
-              <a:rPr lang="fr-FR" dirty="0"/>
-              <a:t>Code</a:t>
+              <a:rPr lang="en-US" sz="4000" kern="1200" dirty="0" err="1">
+                <a:solidFill>
+                  <a:schemeClr val="tx1"/>
+                </a:solidFill>
+                <a:latin typeface="+mj-lt"/>
+                <a:ea typeface="+mj-ea"/>
+                <a:cs typeface="+mj-cs"/>
+              </a:rPr>
+              <a:t>Organisation</a:t>
+            </a:r>
+            <a:r>
+              <a:rPr lang="en-US" sz="4000" kern="1200" dirty="0">
+                <a:solidFill>
+                  <a:schemeClr val="tx1"/>
+                </a:solidFill>
+                <a:latin typeface="+mj-lt"/>
+                <a:ea typeface="+mj-ea"/>
+                <a:cs typeface="+mj-cs"/>
+              </a:rPr>
+              <a:t> du code</a:t>
             </a:r>
           </a:p>
         </p:txBody>
       </p:sp>
       <p:sp>
         <p:nvSpPr>
-          <p:cNvPr id="3" name="Espace réservé du contenu 2">
+          <p:cNvPr id="9" name="Rectangle: Rounded Corners 13">
             <a:extLst>
               <a:ext uri="{FF2B5EF4-FFF2-40B4-BE49-F238E27FC236}">
-                <a16:creationId xmlns:a16="http://schemas.microsoft.com/office/drawing/2014/main" id="{7B619DEF-95BA-492B-9043-3E5CE32104D5}"/>
+                <a16:creationId xmlns:a16="http://schemas.microsoft.com/office/drawing/2014/main" id="{586B4EF9-43BA-4655-A6FF-1D8E21574C95}"/>
+              </a:ext>
+              <a:ext uri="{C183D7F6-B498-43B3-948B-1728B52AA6E4}">
+                <adec:decorative xmlns:adec="http://schemas.microsoft.com/office/drawing/2017/decorative" val="1"/>
+              </a:ext>
+            </a:extLst>
+          </p:cNvPr>
+          <p:cNvSpPr>
+            <a:spLocks noGrp="1" noRot="1" noChangeAspect="1" noMove="1" noResize="1" noEditPoints="1" noAdjustHandles="1" noChangeArrowheads="1" noChangeShapeType="1" noTextEdit="1"/>
+          </p:cNvSpPr>
+          <p:nvPr>
+            <p:extLst>
+              <p:ext uri="{386F3935-93C4-4BCD-93E2-E3B085C9AB24}">
+                <p16:designElem xmlns:p16="http://schemas.microsoft.com/office/powerpoint/2015/main" val="1"/>
+              </p:ext>
+            </p:extLst>
+          </p:nvPr>
+        </p:nvSpPr>
+        <p:spPr>
+          <a:xfrm>
+            <a:off x="2483110" y="1211407"/>
+            <a:ext cx="7225780" cy="685800"/>
+          </a:xfrm>
+          <a:prstGeom prst="roundRect">
+            <a:avLst>
+              <a:gd name="adj" fmla="val 0"/>
+            </a:avLst>
+          </a:prstGeom>
+          <a:solidFill>
+            <a:schemeClr val="accent2"/>
+          </a:solidFill>
+          <a:ln>
+            <a:noFill/>
+          </a:ln>
+        </p:spPr>
+        <p:style>
+          <a:lnRef idx="2">
+            <a:schemeClr val="accent1">
+              <a:shade val="50000"/>
+            </a:schemeClr>
+          </a:lnRef>
+          <a:fillRef idx="1">
+            <a:schemeClr val="accent1"/>
+          </a:fillRef>
+          <a:effectRef idx="0">
+            <a:schemeClr val="accent1"/>
+          </a:effectRef>
+          <a:fontRef idx="minor">
+            <a:schemeClr val="lt1"/>
+          </a:fontRef>
+        </p:style>
+        <p:txBody>
+          <a:bodyPr rtlCol="0" anchor="ctr"/>
+          <a:lstStyle/>
+          <a:p>
+            <a:pPr algn="ctr"/>
+            <a:endParaRPr lang="en-US">
+              <a:solidFill>
+                <a:prstClr val="white"/>
+              </a:solidFill>
+              <a:latin typeface="Calibri" panose="020F0502020204030204"/>
+            </a:endParaRPr>
+          </a:p>
+        </p:txBody>
+      </p:sp>
+      <p:sp>
+        <p:nvSpPr>
+          <p:cNvPr id="5" name="ZoneTexte 4">
+            <a:extLst>
+              <a:ext uri="{FF2B5EF4-FFF2-40B4-BE49-F238E27FC236}">
+                <a16:creationId xmlns:a16="http://schemas.microsoft.com/office/drawing/2014/main" id="{B512AD71-4C3C-4C4D-A4E3-37529BE31B60}"/>
+              </a:ext>
+            </a:extLst>
+          </p:cNvPr>
+          <p:cNvSpPr txBox="1"/>
+          <p:nvPr/>
+        </p:nvSpPr>
+        <p:spPr>
+          <a:xfrm>
+            <a:off x="2615738" y="1263807"/>
+            <a:ext cx="6960524" cy="598516"/>
+          </a:xfrm>
+          <a:prstGeom prst="rect">
+            <a:avLst/>
+          </a:prstGeom>
+        </p:spPr>
+        <p:txBody>
+          <a:bodyPr vert="horz" lIns="91440" tIns="45720" rIns="91440" bIns="45720" rtlCol="0" anchor="ctr">
+            <a:normAutofit/>
+          </a:bodyPr>
+          <a:lstStyle/>
+          <a:p>
+            <a:pPr algn="ctr">
+              <a:lnSpc>
+                <a:spcPct val="90000"/>
+              </a:lnSpc>
+              <a:spcBef>
+                <a:spcPts val="1000"/>
+              </a:spcBef>
+            </a:pPr>
+            <a:r>
+              <a:rPr lang="en-US" sz="2000" kern="1200">
+                <a:solidFill>
+                  <a:schemeClr val="bg1"/>
+                </a:solidFill>
+                <a:latin typeface="+mn-lt"/>
+                <a:ea typeface="+mn-ea"/>
+                <a:cs typeface="+mn-cs"/>
+              </a:rPr>
+              <a:t>Création d’une aire de jeu en 2D avec l’élément CANVAS</a:t>
+            </a:r>
+          </a:p>
+        </p:txBody>
+      </p:sp>
+      <p:pic>
+        <p:nvPicPr>
+          <p:cNvPr id="4" name="Image 3" descr="Une image contenant capture d’écran&#10;&#10;Description générée automatiquement">
+            <a:extLst>
+              <a:ext uri="{FF2B5EF4-FFF2-40B4-BE49-F238E27FC236}">
+                <a16:creationId xmlns:a16="http://schemas.microsoft.com/office/drawing/2014/main" id="{E077906D-DC6D-459C-A998-41039196AC04}"/>
+              </a:ext>
+            </a:extLst>
+          </p:cNvPr>
+          <p:cNvPicPr>
+            <a:picLocks noChangeAspect="1"/>
+          </p:cNvPicPr>
+          <p:nvPr/>
+        </p:nvPicPr>
+        <p:blipFill>
+          <a:blip r:embed="rId2"/>
+          <a:stretch>
+            <a:fillRect/>
+          </a:stretch>
+        </p:blipFill>
+        <p:spPr>
+          <a:xfrm>
+            <a:off x="385572" y="3302625"/>
+            <a:ext cx="11420856" cy="1770229"/>
+          </a:xfrm>
+          <a:prstGeom prst="rect">
+            <a:avLst/>
+          </a:prstGeom>
+        </p:spPr>
+      </p:pic>
+    </p:spTree>
+    <p:extLst>
+      <p:ext uri="{BB962C8B-B14F-4D97-AF65-F5344CB8AC3E}">
+        <p14:creationId xmlns:p14="http://schemas.microsoft.com/office/powerpoint/2010/main" val="2351229625"/>
+      </p:ext>
+    </p:extLst>
+  </p:cSld>
+  <p:clrMapOvr>
+    <a:masterClrMapping/>
+  </p:clrMapOvr>
+</p:sld>
+</file>
+
+<file path=ppt/slides/slide8.xml><?xml version="1.0" encoding="utf-8"?>
+<p:sld xmlns:a="http://schemas.openxmlformats.org/drawingml/2006/main" xmlns:r="http://schemas.openxmlformats.org/officeDocument/2006/relationships" xmlns:p="http://schemas.openxmlformats.org/presentationml/2006/main">
+  <p:cSld>
+    <p:bg>
+      <p:bgPr>
+        <a:solidFill>
+          <a:schemeClr val="bg1"/>
+        </a:solidFill>
+        <a:effectLst/>
+      </p:bgPr>
+    </p:bg>
+    <p:spTree>
+      <p:nvGrpSpPr>
+        <p:cNvPr id="1" name=""/>
+        <p:cNvGrpSpPr/>
+        <p:nvPr/>
+      </p:nvGrpSpPr>
+      <p:grpSpPr>
+        <a:xfrm>
+          <a:off x="0" y="0"/>
+          <a:ext cx="0" cy="0"/>
+          <a:chOff x="0" y="0"/>
+          <a:chExt cx="0" cy="0"/>
+        </a:xfrm>
+      </p:grpSpPr>
+      <p:sp useBgFill="1">
+        <p:nvSpPr>
+          <p:cNvPr id="9" name="Rectangle 8">
+            <a:extLst>
+              <a:ext uri="{FF2B5EF4-FFF2-40B4-BE49-F238E27FC236}">
+                <a16:creationId xmlns:a16="http://schemas.microsoft.com/office/drawing/2014/main" id="{155D7866-985D-4D23-BF0E-72CA30F5C7E9}"/>
+              </a:ext>
+              <a:ext uri="{C183D7F6-B498-43B3-948B-1728B52AA6E4}">
+                <adec:decorative xmlns:adec="http://schemas.microsoft.com/office/drawing/2017/decorative" val="1"/>
+              </a:ext>
+            </a:extLst>
+          </p:cNvPr>
+          <p:cNvSpPr>
+            <a:spLocks noGrp="1" noRot="1" noChangeAspect="1" noMove="1" noResize="1" noEditPoints="1" noAdjustHandles="1" noChangeArrowheads="1" noChangeShapeType="1" noTextEdit="1"/>
+          </p:cNvSpPr>
+          <p:nvPr>
+            <p:extLst>
+              <p:ext uri="{386F3935-93C4-4BCD-93E2-E3B085C9AB24}">
+                <p16:designElem xmlns:p16="http://schemas.microsoft.com/office/powerpoint/2015/main" val="1"/>
+              </p:ext>
+            </p:extLst>
+          </p:nvPr>
+        </p:nvSpPr>
+        <p:spPr>
+          <a:xfrm>
+            <a:off x="0" y="0"/>
+            <a:ext cx="12192000" cy="6858000"/>
+          </a:xfrm>
+          <a:prstGeom prst="rect">
+            <a:avLst/>
+          </a:prstGeom>
+          <a:ln>
+            <a:noFill/>
+          </a:ln>
+        </p:spPr>
+        <p:style>
+          <a:lnRef idx="2">
+            <a:schemeClr val="accent1">
+              <a:shade val="50000"/>
+            </a:schemeClr>
+          </a:lnRef>
+          <a:fillRef idx="1">
+            <a:schemeClr val="accent1"/>
+          </a:fillRef>
+          <a:effectRef idx="0">
+            <a:schemeClr val="accent1"/>
+          </a:effectRef>
+          <a:fontRef idx="minor">
+            <a:schemeClr val="lt1"/>
+          </a:fontRef>
+        </p:style>
+        <p:txBody>
+          <a:bodyPr rtlCol="0" anchor="ctr"/>
+          <a:lstStyle/>
+          <a:p>
+            <a:pPr algn="ctr"/>
+            <a:endParaRPr lang="en-US"/>
+          </a:p>
+        </p:txBody>
+      </p:sp>
+      <p:pic>
+        <p:nvPicPr>
+          <p:cNvPr id="4" name="Espace réservé du contenu 3">
+            <a:extLst>
+              <a:ext uri="{FF2B5EF4-FFF2-40B4-BE49-F238E27FC236}">
+                <a16:creationId xmlns:a16="http://schemas.microsoft.com/office/drawing/2014/main" id="{E79FBC81-AFC6-4033-BE21-688D938C6236}"/>
+              </a:ext>
+            </a:extLst>
+          </p:cNvPr>
+          <p:cNvPicPr>
+            <a:picLocks noGrp="1" noChangeAspect="1"/>
+          </p:cNvPicPr>
+          <p:nvPr>
+            <p:ph idx="1"/>
+          </p:nvPr>
+        </p:nvPicPr>
+        <p:blipFill rotWithShape="1">
+          <a:blip r:embed="rId2"/>
+          <a:srcRect b="1747"/>
+          <a:stretch/>
+        </p:blipFill>
+        <p:spPr>
+          <a:xfrm>
+            <a:off x="20" y="10"/>
+            <a:ext cx="12191980" cy="6857990"/>
+          </a:xfrm>
+          <a:prstGeom prst="rect">
+            <a:avLst/>
+          </a:prstGeom>
+        </p:spPr>
+      </p:pic>
+      <p:sp>
+        <p:nvSpPr>
+          <p:cNvPr id="11" name="Rectangle 10">
+            <a:extLst>
+              <a:ext uri="{FF2B5EF4-FFF2-40B4-BE49-F238E27FC236}">
+                <a16:creationId xmlns:a16="http://schemas.microsoft.com/office/drawing/2014/main" id="{0ADDB668-2CA4-4D2B-9C34-3487CA330BA8}"/>
+              </a:ext>
+              <a:ext uri="{C183D7F6-B498-43B3-948B-1728B52AA6E4}">
+                <adec:decorative xmlns:adec="http://schemas.microsoft.com/office/drawing/2017/decorative" val="1"/>
+              </a:ext>
+            </a:extLst>
+          </p:cNvPr>
+          <p:cNvSpPr>
+            <a:spLocks noGrp="1" noRot="1" noChangeAspect="1" noMove="1" noResize="1" noEditPoints="1" noAdjustHandles="1" noChangeArrowheads="1" noChangeShapeType="1" noTextEdit="1"/>
+          </p:cNvSpPr>
+          <p:nvPr>
+            <p:extLst>
+              <p:ext uri="{386F3935-93C4-4BCD-93E2-E3B085C9AB24}">
+                <p16:designElem xmlns:p16="http://schemas.microsoft.com/office/powerpoint/2015/main" val="1"/>
+              </p:ext>
+            </p:extLst>
+          </p:nvPr>
+        </p:nvSpPr>
+        <p:spPr>
+          <a:xfrm>
+            <a:off x="5544731" y="4716089"/>
+            <a:ext cx="6288261" cy="1573149"/>
+          </a:xfrm>
+          <a:prstGeom prst="rect">
+            <a:avLst/>
+          </a:prstGeom>
+          <a:solidFill>
+            <a:schemeClr val="bg1">
+              <a:alpha val="95000"/>
+            </a:schemeClr>
+          </a:solidFill>
+          <a:ln w="12700">
+            <a:solidFill>
+              <a:srgbClr val="EFEFEF"/>
+            </a:solidFill>
+          </a:ln>
+          <a:effectLst/>
+        </p:spPr>
+        <p:style>
+          <a:lnRef idx="2">
+            <a:schemeClr val="accent1">
+              <a:shade val="50000"/>
+            </a:schemeClr>
+          </a:lnRef>
+          <a:fillRef idx="1">
+            <a:schemeClr val="accent1"/>
+          </a:fillRef>
+          <a:effectRef idx="0">
+            <a:schemeClr val="accent1"/>
+          </a:effectRef>
+          <a:fontRef idx="minor">
+            <a:schemeClr val="lt1"/>
+          </a:fontRef>
+        </p:style>
+        <p:txBody>
+          <a:bodyPr rtlCol="0" anchor="ctr"/>
+          <a:lstStyle/>
+          <a:p>
+            <a:pPr marL="0" marR="0" lvl="0" indent="0" algn="ctr" defTabSz="914400" rtl="0" eaLnBrk="1" fontAlgn="auto" latinLnBrk="0" hangingPunct="1">
+              <a:lnSpc>
+                <a:spcPct val="100000"/>
+              </a:lnSpc>
+              <a:spcBef>
+                <a:spcPts val="0"/>
+              </a:spcBef>
+              <a:spcAft>
+                <a:spcPts val="0"/>
+              </a:spcAft>
+              <a:buClrTx/>
+              <a:buSzTx/>
+              <a:buFontTx/>
+              <a:buNone/>
+              <a:tabLst/>
+              <a:defRPr/>
+            </a:pPr>
+            <a:endParaRPr kumimoji="0" lang="en-US" sz="1800" b="0" i="0" u="none" strike="noStrike" kern="1200" cap="none" spc="0" normalizeH="0" baseline="0" noProof="0">
+              <a:ln>
+                <a:noFill/>
+              </a:ln>
+              <a:solidFill>
+                <a:prstClr val="white"/>
+              </a:solidFill>
+              <a:effectLst/>
+              <a:uLnTx/>
+              <a:uFillTx/>
+              <a:latin typeface="Calibri" panose="020F0502020204030204"/>
+              <a:ea typeface="+mn-ea"/>
+              <a:cs typeface="+mn-cs"/>
+            </a:endParaRPr>
+          </a:p>
+        </p:txBody>
+      </p:sp>
+      <p:sp>
+        <p:nvSpPr>
+          <p:cNvPr id="2" name="Titre 1">
+            <a:extLst>
+              <a:ext uri="{FF2B5EF4-FFF2-40B4-BE49-F238E27FC236}">
+                <a16:creationId xmlns:a16="http://schemas.microsoft.com/office/drawing/2014/main" id="{5EA320D7-55F1-418D-9A5D-A4CDB0AB775D}"/>
               </a:ext>
             </a:extLst>
           </p:cNvPr>
@@ -10681,22 +12424,619 @@
             <a:spLocks noGrp="1"/>
           </p:cNvSpPr>
           <p:nvPr>
-            <p:ph idx="1"/>
+            <p:ph type="title"/>
           </p:nvPr>
         </p:nvSpPr>
-        <p:spPr/>
+        <p:spPr>
+          <a:xfrm>
+            <a:off x="5849388" y="4907629"/>
+            <a:ext cx="3212386" cy="1185353"/>
+          </a:xfrm>
+        </p:spPr>
         <p:txBody>
-          <a:bodyPr/>
+          <a:bodyPr vert="horz" lIns="91440" tIns="45720" rIns="91440" bIns="45720" rtlCol="0" anchor="ctr">
+            <a:normAutofit/>
+          </a:bodyPr>
           <a:lstStyle/>
           <a:p>
-            <a:endParaRPr lang="fr-FR"/>
+            <a:r>
+              <a:rPr lang="en-US" sz="2600" dirty="0" err="1"/>
+              <a:t>Création</a:t>
+            </a:r>
+            <a:r>
+              <a:rPr lang="en-US" sz="2600" dirty="0"/>
+              <a:t> des classes</a:t>
+            </a:r>
+          </a:p>
+        </p:txBody>
+      </p:sp>
+      <p:sp>
+        <p:nvSpPr>
+          <p:cNvPr id="13" name="Rectangle 12">
+            <a:extLst>
+              <a:ext uri="{FF2B5EF4-FFF2-40B4-BE49-F238E27FC236}">
+                <a16:creationId xmlns:a16="http://schemas.microsoft.com/office/drawing/2014/main" id="{2568BC19-F052-4108-93E1-6A3D1DEC072F}"/>
+              </a:ext>
+              <a:ext uri="{C183D7F6-B498-43B3-948B-1728B52AA6E4}">
+                <adec:decorative xmlns:adec="http://schemas.microsoft.com/office/drawing/2017/decorative" val="1"/>
+              </a:ext>
+            </a:extLst>
+          </p:cNvPr>
+          <p:cNvSpPr>
+            <a:spLocks noGrp="1" noRot="1" noChangeAspect="1" noMove="1" noResize="1" noEditPoints="1" noAdjustHandles="1" noChangeArrowheads="1" noChangeShapeType="1" noTextEdit="1"/>
+          </p:cNvSpPr>
+          <p:nvPr>
+            <p:extLst>
+              <p:ext uri="{386F3935-93C4-4BCD-93E2-E3B085C9AB24}">
+                <p16:designElem xmlns:p16="http://schemas.microsoft.com/office/powerpoint/2015/main" val="1"/>
+              </p:ext>
+            </p:extLst>
+          </p:nvPr>
+        </p:nvSpPr>
+        <p:spPr>
+          <a:xfrm>
+            <a:off x="5487962" y="5175711"/>
+            <a:ext cx="128016" cy="653903"/>
+          </a:xfrm>
+          <a:prstGeom prst="rect">
+            <a:avLst/>
+          </a:prstGeom>
+          <a:solidFill>
+            <a:schemeClr val="accent2"/>
+          </a:solidFill>
+          <a:ln>
+            <a:noFill/>
+          </a:ln>
+        </p:spPr>
+        <p:style>
+          <a:lnRef idx="2">
+            <a:schemeClr val="accent1">
+              <a:shade val="50000"/>
+            </a:schemeClr>
+          </a:lnRef>
+          <a:fillRef idx="1">
+            <a:schemeClr val="accent1"/>
+          </a:fillRef>
+          <a:effectRef idx="0">
+            <a:schemeClr val="accent1"/>
+          </a:effectRef>
+          <a:fontRef idx="minor">
+            <a:schemeClr val="lt1"/>
+          </a:fontRef>
+        </p:style>
+        <p:txBody>
+          <a:bodyPr rtlCol="0" anchor="ctr"/>
+          <a:lstStyle/>
+          <a:p>
+            <a:pPr algn="ctr"/>
+            <a:endParaRPr lang="en-US">
+              <a:solidFill>
+                <a:prstClr val="white"/>
+              </a:solidFill>
+              <a:latin typeface="Calibri" panose="020F0502020204030204"/>
+            </a:endParaRPr>
+          </a:p>
+        </p:txBody>
+      </p:sp>
+      <p:sp>
+        <p:nvSpPr>
+          <p:cNvPr id="15" name="Rectangle 14">
+            <a:extLst>
+              <a:ext uri="{FF2B5EF4-FFF2-40B4-BE49-F238E27FC236}">
+                <a16:creationId xmlns:a16="http://schemas.microsoft.com/office/drawing/2014/main" id="{D5FD337D-4D6B-4C8B-B6F5-121097E09881}"/>
+              </a:ext>
+              <a:ext uri="{C183D7F6-B498-43B3-948B-1728B52AA6E4}">
+                <adec:decorative xmlns:adec="http://schemas.microsoft.com/office/drawing/2017/decorative" val="1"/>
+              </a:ext>
+            </a:extLst>
+          </p:cNvPr>
+          <p:cNvSpPr>
+            <a:spLocks noGrp="1" noRot="1" noChangeAspect="1" noMove="1" noResize="1" noEditPoints="1" noAdjustHandles="1" noChangeArrowheads="1" noChangeShapeType="1" noTextEdit="1"/>
+          </p:cNvSpPr>
+          <p:nvPr>
+            <p:extLst>
+              <p:ext uri="{386F3935-93C4-4BCD-93E2-E3B085C9AB24}">
+                <p16:designElem xmlns:p16="http://schemas.microsoft.com/office/powerpoint/2015/main" val="1"/>
+              </p:ext>
+            </p:extLst>
+          </p:nvPr>
+        </p:nvSpPr>
+        <p:spPr>
+          <a:xfrm rot="5400000">
+            <a:off x="8722114" y="5495733"/>
+            <a:ext cx="1021458" cy="9144"/>
+          </a:xfrm>
+          <a:prstGeom prst="rect">
+            <a:avLst/>
+          </a:prstGeom>
+          <a:solidFill>
+            <a:srgbClr val="D5D5D5"/>
+          </a:solidFill>
+          <a:ln w="3175">
+            <a:noFill/>
+          </a:ln>
+          <a:effectLst/>
+        </p:spPr>
+        <p:style>
+          <a:lnRef idx="2">
+            <a:schemeClr val="accent1">
+              <a:shade val="50000"/>
+            </a:schemeClr>
+          </a:lnRef>
+          <a:fillRef idx="1">
+            <a:schemeClr val="accent1"/>
+          </a:fillRef>
+          <a:effectRef idx="0">
+            <a:schemeClr val="accent1"/>
+          </a:effectRef>
+          <a:fontRef idx="minor">
+            <a:schemeClr val="lt1"/>
+          </a:fontRef>
+        </p:style>
+        <p:txBody>
+          <a:bodyPr rtlCol="0" anchor="ctr"/>
+          <a:lstStyle/>
+          <a:p>
+            <a:pPr marL="0" marR="0" lvl="0" indent="0" algn="ctr" defTabSz="914400" rtl="0" eaLnBrk="1" fontAlgn="auto" latinLnBrk="0" hangingPunct="1">
+              <a:lnSpc>
+                <a:spcPct val="100000"/>
+              </a:lnSpc>
+              <a:spcBef>
+                <a:spcPts val="0"/>
+              </a:spcBef>
+              <a:spcAft>
+                <a:spcPts val="0"/>
+              </a:spcAft>
+              <a:buClrTx/>
+              <a:buSzTx/>
+              <a:buFontTx/>
+              <a:buNone/>
+              <a:tabLst/>
+              <a:defRPr/>
+            </a:pPr>
+            <a:endParaRPr kumimoji="0" lang="en-US" sz="1800" b="0" i="0" u="none" strike="noStrike" kern="1200" cap="none" spc="0" normalizeH="0" baseline="0" noProof="0">
+              <a:ln>
+                <a:noFill/>
+              </a:ln>
+              <a:solidFill>
+                <a:prstClr val="white"/>
+              </a:solidFill>
+              <a:effectLst/>
+              <a:uLnTx/>
+              <a:uFillTx/>
+              <a:latin typeface="Calibri" panose="020F0502020204030204"/>
+              <a:ea typeface="+mn-ea"/>
+              <a:cs typeface="+mn-cs"/>
+            </a:endParaRPr>
           </a:p>
         </p:txBody>
       </p:sp>
     </p:spTree>
     <p:extLst>
       <p:ext uri="{BB962C8B-B14F-4D97-AF65-F5344CB8AC3E}">
-        <p14:creationId xmlns:p14="http://schemas.microsoft.com/office/powerpoint/2010/main" val="2351229625"/>
+        <p14:creationId xmlns:p14="http://schemas.microsoft.com/office/powerpoint/2010/main" val="627470338"/>
+      </p:ext>
+    </p:extLst>
+  </p:cSld>
+  <p:clrMapOvr>
+    <a:masterClrMapping/>
+  </p:clrMapOvr>
+</p:sld>
+</file>
+
+<file path=ppt/slides/slide9.xml><?xml version="1.0" encoding="utf-8"?>
+<p:sld xmlns:a="http://schemas.openxmlformats.org/drawingml/2006/main" xmlns:r="http://schemas.openxmlformats.org/officeDocument/2006/relationships" xmlns:p="http://schemas.openxmlformats.org/presentationml/2006/main">
+  <p:cSld>
+    <p:bg>
+      <p:bgPr>
+        <a:solidFill>
+          <a:schemeClr val="bg1"/>
+        </a:solidFill>
+        <a:effectLst/>
+      </p:bgPr>
+    </p:bg>
+    <p:spTree>
+      <p:nvGrpSpPr>
+        <p:cNvPr id="1" name=""/>
+        <p:cNvGrpSpPr/>
+        <p:nvPr/>
+      </p:nvGrpSpPr>
+      <p:grpSpPr>
+        <a:xfrm>
+          <a:off x="0" y="0"/>
+          <a:ext cx="0" cy="0"/>
+          <a:chOff x="0" y="0"/>
+          <a:chExt cx="0" cy="0"/>
+        </a:xfrm>
+      </p:grpSpPr>
+      <p:sp useBgFill="1">
+        <p:nvSpPr>
+          <p:cNvPr id="9" name="Rectangle 8">
+            <a:extLst>
+              <a:ext uri="{FF2B5EF4-FFF2-40B4-BE49-F238E27FC236}">
+                <a16:creationId xmlns:a16="http://schemas.microsoft.com/office/drawing/2014/main" id="{155D7866-985D-4D23-BF0E-72CA30F5C7E9}"/>
+              </a:ext>
+              <a:ext uri="{C183D7F6-B498-43B3-948B-1728B52AA6E4}">
+                <adec:decorative xmlns:adec="http://schemas.microsoft.com/office/drawing/2017/decorative" val="1"/>
+              </a:ext>
+            </a:extLst>
+          </p:cNvPr>
+          <p:cNvSpPr>
+            <a:spLocks noGrp="1" noRot="1" noChangeAspect="1" noMove="1" noResize="1" noEditPoints="1" noAdjustHandles="1" noChangeArrowheads="1" noChangeShapeType="1" noTextEdit="1"/>
+          </p:cNvSpPr>
+          <p:nvPr>
+            <p:extLst>
+              <p:ext uri="{386F3935-93C4-4BCD-93E2-E3B085C9AB24}">
+                <p16:designElem xmlns:p16="http://schemas.microsoft.com/office/powerpoint/2015/main" val="1"/>
+              </p:ext>
+            </p:extLst>
+          </p:nvPr>
+        </p:nvSpPr>
+        <p:spPr>
+          <a:xfrm>
+            <a:off x="0" y="0"/>
+            <a:ext cx="12192000" cy="6858000"/>
+          </a:xfrm>
+          <a:prstGeom prst="rect">
+            <a:avLst/>
+          </a:prstGeom>
+          <a:ln>
+            <a:noFill/>
+          </a:ln>
+        </p:spPr>
+        <p:style>
+          <a:lnRef idx="2">
+            <a:schemeClr val="accent1">
+              <a:shade val="50000"/>
+            </a:schemeClr>
+          </a:lnRef>
+          <a:fillRef idx="1">
+            <a:schemeClr val="accent1"/>
+          </a:fillRef>
+          <a:effectRef idx="0">
+            <a:schemeClr val="accent1"/>
+          </a:effectRef>
+          <a:fontRef idx="minor">
+            <a:schemeClr val="lt1"/>
+          </a:fontRef>
+        </p:style>
+        <p:txBody>
+          <a:bodyPr rtlCol="0" anchor="ctr"/>
+          <a:lstStyle/>
+          <a:p>
+            <a:pPr algn="ctr"/>
+            <a:endParaRPr lang="en-US"/>
+          </a:p>
+        </p:txBody>
+      </p:sp>
+      <p:pic>
+        <p:nvPicPr>
+          <p:cNvPr id="4" name="Espace réservé du contenu 3">
+            <a:extLst>
+              <a:ext uri="{FF2B5EF4-FFF2-40B4-BE49-F238E27FC236}">
+                <a16:creationId xmlns:a16="http://schemas.microsoft.com/office/drawing/2014/main" id="{55B38CD1-5869-4D7F-8018-6A00CD70C7CE}"/>
+              </a:ext>
+            </a:extLst>
+          </p:cNvPr>
+          <p:cNvPicPr>
+            <a:picLocks noGrp="1" noChangeAspect="1"/>
+          </p:cNvPicPr>
+          <p:nvPr>
+            <p:ph idx="1"/>
+          </p:nvPr>
+        </p:nvPicPr>
+        <p:blipFill rotWithShape="1">
+          <a:blip r:embed="rId2"/>
+          <a:srcRect r="69778"/>
+          <a:stretch/>
+        </p:blipFill>
+        <p:spPr>
+          <a:xfrm>
+            <a:off x="20" y="10"/>
+            <a:ext cx="12191980" cy="6857990"/>
+          </a:xfrm>
+          <a:prstGeom prst="rect">
+            <a:avLst/>
+          </a:prstGeom>
+        </p:spPr>
+      </p:pic>
+      <p:sp>
+        <p:nvSpPr>
+          <p:cNvPr id="11" name="Rectangle 10">
+            <a:extLst>
+              <a:ext uri="{FF2B5EF4-FFF2-40B4-BE49-F238E27FC236}">
+                <a16:creationId xmlns:a16="http://schemas.microsoft.com/office/drawing/2014/main" id="{0ADDB668-2CA4-4D2B-9C34-3487CA330BA8}"/>
+              </a:ext>
+              <a:ext uri="{C183D7F6-B498-43B3-948B-1728B52AA6E4}">
+                <adec:decorative xmlns:adec="http://schemas.microsoft.com/office/drawing/2017/decorative" val="1"/>
+              </a:ext>
+            </a:extLst>
+          </p:cNvPr>
+          <p:cNvSpPr>
+            <a:spLocks noGrp="1" noRot="1" noChangeAspect="1" noMove="1" noResize="1" noEditPoints="1" noAdjustHandles="1" noChangeArrowheads="1" noChangeShapeType="1" noTextEdit="1"/>
+          </p:cNvSpPr>
+          <p:nvPr>
+            <p:extLst>
+              <p:ext uri="{386F3935-93C4-4BCD-93E2-E3B085C9AB24}">
+                <p16:designElem xmlns:p16="http://schemas.microsoft.com/office/powerpoint/2015/main" val="1"/>
+              </p:ext>
+            </p:extLst>
+          </p:nvPr>
+        </p:nvSpPr>
+        <p:spPr>
+          <a:xfrm>
+            <a:off x="5544731" y="4716089"/>
+            <a:ext cx="6288261" cy="1573149"/>
+          </a:xfrm>
+          <a:prstGeom prst="rect">
+            <a:avLst/>
+          </a:prstGeom>
+          <a:solidFill>
+            <a:schemeClr val="bg1">
+              <a:alpha val="95000"/>
+            </a:schemeClr>
+          </a:solidFill>
+          <a:ln w="12700">
+            <a:solidFill>
+              <a:srgbClr val="EFEFEF"/>
+            </a:solidFill>
+          </a:ln>
+          <a:effectLst/>
+        </p:spPr>
+        <p:style>
+          <a:lnRef idx="2">
+            <a:schemeClr val="accent1">
+              <a:shade val="50000"/>
+            </a:schemeClr>
+          </a:lnRef>
+          <a:fillRef idx="1">
+            <a:schemeClr val="accent1"/>
+          </a:fillRef>
+          <a:effectRef idx="0">
+            <a:schemeClr val="accent1"/>
+          </a:effectRef>
+          <a:fontRef idx="minor">
+            <a:schemeClr val="lt1"/>
+          </a:fontRef>
+        </p:style>
+        <p:txBody>
+          <a:bodyPr rtlCol="0" anchor="ctr"/>
+          <a:lstStyle/>
+          <a:p>
+            <a:pPr marL="0" marR="0" lvl="0" indent="0" algn="ctr" defTabSz="914400" rtl="0" eaLnBrk="1" fontAlgn="auto" latinLnBrk="0" hangingPunct="1">
+              <a:lnSpc>
+                <a:spcPct val="100000"/>
+              </a:lnSpc>
+              <a:spcBef>
+                <a:spcPts val="0"/>
+              </a:spcBef>
+              <a:spcAft>
+                <a:spcPts val="0"/>
+              </a:spcAft>
+              <a:buClrTx/>
+              <a:buSzTx/>
+              <a:buFontTx/>
+              <a:buNone/>
+              <a:tabLst/>
+              <a:defRPr/>
+            </a:pPr>
+            <a:endParaRPr kumimoji="0" lang="en-US" sz="1800" b="0" i="0" u="none" strike="noStrike" kern="1200" cap="none" spc="0" normalizeH="0" baseline="0" noProof="0">
+              <a:ln>
+                <a:noFill/>
+              </a:ln>
+              <a:solidFill>
+                <a:prstClr val="white"/>
+              </a:solidFill>
+              <a:effectLst/>
+              <a:uLnTx/>
+              <a:uFillTx/>
+              <a:latin typeface="Calibri" panose="020F0502020204030204"/>
+              <a:ea typeface="+mn-ea"/>
+              <a:cs typeface="+mn-cs"/>
+            </a:endParaRPr>
+          </a:p>
+        </p:txBody>
+      </p:sp>
+      <p:sp>
+        <p:nvSpPr>
+          <p:cNvPr id="2" name="Titre 1">
+            <a:extLst>
+              <a:ext uri="{FF2B5EF4-FFF2-40B4-BE49-F238E27FC236}">
+                <a16:creationId xmlns:a16="http://schemas.microsoft.com/office/drawing/2014/main" id="{E94A1F19-2D5E-45F0-9D78-2E199359DC41}"/>
+              </a:ext>
+            </a:extLst>
+          </p:cNvPr>
+          <p:cNvSpPr>
+            <a:spLocks noGrp="1"/>
+          </p:cNvSpPr>
+          <p:nvPr>
+            <p:ph type="title"/>
+          </p:nvPr>
+        </p:nvSpPr>
+        <p:spPr>
+          <a:xfrm>
+            <a:off x="5849388" y="4907629"/>
+            <a:ext cx="3212386" cy="1185353"/>
+          </a:xfrm>
+        </p:spPr>
+        <p:txBody>
+          <a:bodyPr vert="horz" lIns="91440" tIns="45720" rIns="91440" bIns="45720" rtlCol="0" anchor="ctr">
+            <a:normAutofit/>
+          </a:bodyPr>
+          <a:lstStyle/>
+          <a:p>
+            <a:r>
+              <a:rPr lang="en-US" sz="2600"/>
+              <a:t>Fonction du jeu</a:t>
+            </a:r>
+          </a:p>
+        </p:txBody>
+      </p:sp>
+      <p:sp>
+        <p:nvSpPr>
+          <p:cNvPr id="13" name="Rectangle 12">
+            <a:extLst>
+              <a:ext uri="{FF2B5EF4-FFF2-40B4-BE49-F238E27FC236}">
+                <a16:creationId xmlns:a16="http://schemas.microsoft.com/office/drawing/2014/main" id="{2568BC19-F052-4108-93E1-6A3D1DEC072F}"/>
+              </a:ext>
+              <a:ext uri="{C183D7F6-B498-43B3-948B-1728B52AA6E4}">
+                <adec:decorative xmlns:adec="http://schemas.microsoft.com/office/drawing/2017/decorative" val="1"/>
+              </a:ext>
+            </a:extLst>
+          </p:cNvPr>
+          <p:cNvSpPr>
+            <a:spLocks noGrp="1" noRot="1" noChangeAspect="1" noMove="1" noResize="1" noEditPoints="1" noAdjustHandles="1" noChangeArrowheads="1" noChangeShapeType="1" noTextEdit="1"/>
+          </p:cNvSpPr>
+          <p:nvPr>
+            <p:extLst>
+              <p:ext uri="{386F3935-93C4-4BCD-93E2-E3B085C9AB24}">
+                <p16:designElem xmlns:p16="http://schemas.microsoft.com/office/powerpoint/2015/main" val="1"/>
+              </p:ext>
+            </p:extLst>
+          </p:nvPr>
+        </p:nvSpPr>
+        <p:spPr>
+          <a:xfrm>
+            <a:off x="5487962" y="5175711"/>
+            <a:ext cx="128016" cy="653903"/>
+          </a:xfrm>
+          <a:prstGeom prst="rect">
+            <a:avLst/>
+          </a:prstGeom>
+          <a:solidFill>
+            <a:schemeClr val="accent2"/>
+          </a:solidFill>
+          <a:ln>
+            <a:noFill/>
+          </a:ln>
+        </p:spPr>
+        <p:style>
+          <a:lnRef idx="2">
+            <a:schemeClr val="accent1">
+              <a:shade val="50000"/>
+            </a:schemeClr>
+          </a:lnRef>
+          <a:fillRef idx="1">
+            <a:schemeClr val="accent1"/>
+          </a:fillRef>
+          <a:effectRef idx="0">
+            <a:schemeClr val="accent1"/>
+          </a:effectRef>
+          <a:fontRef idx="minor">
+            <a:schemeClr val="lt1"/>
+          </a:fontRef>
+        </p:style>
+        <p:txBody>
+          <a:bodyPr rtlCol="0" anchor="ctr"/>
+          <a:lstStyle/>
+          <a:p>
+            <a:pPr algn="ctr"/>
+            <a:endParaRPr lang="en-US">
+              <a:solidFill>
+                <a:prstClr val="white"/>
+              </a:solidFill>
+              <a:latin typeface="Calibri" panose="020F0502020204030204"/>
+            </a:endParaRPr>
+          </a:p>
+        </p:txBody>
+      </p:sp>
+      <p:sp>
+        <p:nvSpPr>
+          <p:cNvPr id="15" name="Rectangle 14">
+            <a:extLst>
+              <a:ext uri="{FF2B5EF4-FFF2-40B4-BE49-F238E27FC236}">
+                <a16:creationId xmlns:a16="http://schemas.microsoft.com/office/drawing/2014/main" id="{D5FD337D-4D6B-4C8B-B6F5-121097E09881}"/>
+              </a:ext>
+              <a:ext uri="{C183D7F6-B498-43B3-948B-1728B52AA6E4}">
+                <adec:decorative xmlns:adec="http://schemas.microsoft.com/office/drawing/2017/decorative" val="1"/>
+              </a:ext>
+            </a:extLst>
+          </p:cNvPr>
+          <p:cNvSpPr>
+            <a:spLocks noGrp="1" noRot="1" noChangeAspect="1" noMove="1" noResize="1" noEditPoints="1" noAdjustHandles="1" noChangeArrowheads="1" noChangeShapeType="1" noTextEdit="1"/>
+          </p:cNvSpPr>
+          <p:nvPr>
+            <p:extLst>
+              <p:ext uri="{386F3935-93C4-4BCD-93E2-E3B085C9AB24}">
+                <p16:designElem xmlns:p16="http://schemas.microsoft.com/office/powerpoint/2015/main" val="1"/>
+              </p:ext>
+            </p:extLst>
+          </p:nvPr>
+        </p:nvSpPr>
+        <p:spPr>
+          <a:xfrm rot="5400000">
+            <a:off x="8722114" y="5495733"/>
+            <a:ext cx="1021458" cy="9144"/>
+          </a:xfrm>
+          <a:prstGeom prst="rect">
+            <a:avLst/>
+          </a:prstGeom>
+          <a:solidFill>
+            <a:srgbClr val="D5D5D5"/>
+          </a:solidFill>
+          <a:ln w="3175">
+            <a:noFill/>
+          </a:ln>
+          <a:effectLst/>
+        </p:spPr>
+        <p:style>
+          <a:lnRef idx="2">
+            <a:schemeClr val="accent1">
+              <a:shade val="50000"/>
+            </a:schemeClr>
+          </a:lnRef>
+          <a:fillRef idx="1">
+            <a:schemeClr val="accent1"/>
+          </a:fillRef>
+          <a:effectRef idx="0">
+            <a:schemeClr val="accent1"/>
+          </a:effectRef>
+          <a:fontRef idx="minor">
+            <a:schemeClr val="lt1"/>
+          </a:fontRef>
+        </p:style>
+        <p:txBody>
+          <a:bodyPr rtlCol="0" anchor="ctr"/>
+          <a:lstStyle/>
+          <a:p>
+            <a:pPr marL="0" marR="0" lvl="0" indent="0" algn="ctr" defTabSz="914400" rtl="0" eaLnBrk="1" fontAlgn="auto" latinLnBrk="0" hangingPunct="1">
+              <a:lnSpc>
+                <a:spcPct val="100000"/>
+              </a:lnSpc>
+              <a:spcBef>
+                <a:spcPts val="0"/>
+              </a:spcBef>
+              <a:spcAft>
+                <a:spcPts val="0"/>
+              </a:spcAft>
+              <a:buClrTx/>
+              <a:buSzTx/>
+              <a:buFontTx/>
+              <a:buNone/>
+              <a:tabLst/>
+              <a:defRPr/>
+            </a:pPr>
+            <a:endParaRPr kumimoji="0" lang="en-US" sz="1800" b="0" i="0" u="none" strike="noStrike" kern="1200" cap="none" spc="0" normalizeH="0" baseline="0" noProof="0">
+              <a:ln>
+                <a:noFill/>
+              </a:ln>
+              <a:solidFill>
+                <a:prstClr val="white"/>
+              </a:solidFill>
+              <a:effectLst/>
+              <a:uLnTx/>
+              <a:uFillTx/>
+              <a:latin typeface="Calibri" panose="020F0502020204030204"/>
+              <a:ea typeface="+mn-ea"/>
+              <a:cs typeface="+mn-cs"/>
+            </a:endParaRPr>
+          </a:p>
+        </p:txBody>
+      </p:sp>
+    </p:spTree>
+    <p:extLst>
+      <p:ext uri="{BB962C8B-B14F-4D97-AF65-F5344CB8AC3E}">
+        <p14:creationId xmlns:p14="http://schemas.microsoft.com/office/powerpoint/2010/main" val="3580276011"/>
       </p:ext>
     </p:extLst>
   </p:cSld>

</xml_diff>